<commit_message>
update the test result slides
</commit_message>
<xml_diff>
--- a/TensorflowScalabilityTest.pptx
+++ b/TensorflowScalabilityTest.pptx
@@ -5,17 +5,21 @@
     <p:sldMasterId id="2147483648" r:id="rId1"/>
   </p:sldMasterIdLst>
   <p:notesMasterIdLst>
-    <p:notesMasterId r:id="rId10"/>
+    <p:notesMasterId r:id="rId14"/>
   </p:notesMasterIdLst>
   <p:sldIdLst>
     <p:sldId id="256" r:id="rId2"/>
     <p:sldId id="257" r:id="rId3"/>
     <p:sldId id="258" r:id="rId4"/>
-    <p:sldId id="259" r:id="rId5"/>
-    <p:sldId id="260" r:id="rId6"/>
-    <p:sldId id="261" r:id="rId7"/>
-    <p:sldId id="263" r:id="rId8"/>
-    <p:sldId id="262" r:id="rId9"/>
+    <p:sldId id="265" r:id="rId5"/>
+    <p:sldId id="259" r:id="rId6"/>
+    <p:sldId id="260" r:id="rId7"/>
+    <p:sldId id="261" r:id="rId8"/>
+    <p:sldId id="263" r:id="rId9"/>
+    <p:sldId id="266" r:id="rId10"/>
+    <p:sldId id="267" r:id="rId11"/>
+    <p:sldId id="264" r:id="rId12"/>
+    <p:sldId id="262" r:id="rId13"/>
   </p:sldIdLst>
   <p:sldSz cx="12192000" cy="6858000"/>
   <p:notesSz cx="6858000" cy="9144000"/>
@@ -204,7 +208,7 @@
           <a:p>
             <a:fld id="{6E0FC61B-438D-3A4B-BE07-2CA3E69BE524}" type="datetimeFigureOut">
               <a:rPr lang="en-US" smtClean="0"/>
-              <a:t>10/3/17</a:t>
+              <a:t>10/5/17</a:t>
             </a:fld>
             <a:endParaRPr lang="en-US"/>
           </a:p>
@@ -687,7 +691,7 @@
           <a:p>
             <a:fld id="{2114E835-5FA6-8A40-8097-C04DC1B8AFDC}" type="datetime1">
               <a:rPr lang="en-US" smtClean="0"/>
-              <a:t>10/3/17</a:t>
+              <a:t>10/5/17</a:t>
             </a:fld>
             <a:endParaRPr lang="en-US"/>
           </a:p>
@@ -857,7 +861,7 @@
           <a:p>
             <a:fld id="{D02507F0-C546-5D4A-98D5-FE825995B7A4}" type="datetime1">
               <a:rPr lang="en-US" smtClean="0"/>
-              <a:t>10/3/17</a:t>
+              <a:t>10/5/17</a:t>
             </a:fld>
             <a:endParaRPr lang="en-US"/>
           </a:p>
@@ -1037,7 +1041,7 @@
           <a:p>
             <a:fld id="{4FA9C43D-5060-FC42-B3DE-9B34E1B634EB}" type="datetime1">
               <a:rPr lang="en-US" smtClean="0"/>
-              <a:t>10/3/17</a:t>
+              <a:t>10/5/17</a:t>
             </a:fld>
             <a:endParaRPr lang="en-US"/>
           </a:p>
@@ -1207,7 +1211,7 @@
           <a:p>
             <a:fld id="{1227501B-172F-2D40-8C05-C80F8A266233}" type="datetime1">
               <a:rPr lang="en-US" smtClean="0"/>
-              <a:t>10/3/17</a:t>
+              <a:t>10/5/17</a:t>
             </a:fld>
             <a:endParaRPr lang="en-US"/>
           </a:p>
@@ -1453,7 +1457,7 @@
           <a:p>
             <a:fld id="{158C9B4A-08A2-6147-8C66-2CA86A1C2CC1}" type="datetime1">
               <a:rPr lang="en-US" smtClean="0"/>
-              <a:t>10/3/17</a:t>
+              <a:t>10/5/17</a:t>
             </a:fld>
             <a:endParaRPr lang="en-US"/>
           </a:p>
@@ -1685,7 +1689,7 @@
           <a:p>
             <a:fld id="{84B048FE-46D8-7648-B1D9-02EAA3F919B5}" type="datetime1">
               <a:rPr lang="en-US" smtClean="0"/>
-              <a:t>10/3/17</a:t>
+              <a:t>10/5/17</a:t>
             </a:fld>
             <a:endParaRPr lang="en-US"/>
           </a:p>
@@ -2052,7 +2056,7 @@
           <a:p>
             <a:fld id="{34FAD8A9-3430-E846-BC47-E47A75003C48}" type="datetime1">
               <a:rPr lang="en-US" smtClean="0"/>
-              <a:t>10/3/17</a:t>
+              <a:t>10/5/17</a:t>
             </a:fld>
             <a:endParaRPr lang="en-US"/>
           </a:p>
@@ -2170,7 +2174,7 @@
           <a:p>
             <a:fld id="{A3F67BFF-3F57-B246-BBD5-73D9B7B1AC75}" type="datetime1">
               <a:rPr lang="en-US" smtClean="0"/>
-              <a:t>10/3/17</a:t>
+              <a:t>10/5/17</a:t>
             </a:fld>
             <a:endParaRPr lang="en-US"/>
           </a:p>
@@ -2265,7 +2269,7 @@
           <a:p>
             <a:fld id="{1D68328A-485D-7142-8777-407E24CAF04C}" type="datetime1">
               <a:rPr lang="en-US" smtClean="0"/>
-              <a:t>10/3/17</a:t>
+              <a:t>10/5/17</a:t>
             </a:fld>
             <a:endParaRPr lang="en-US"/>
           </a:p>
@@ -2542,7 +2546,7 @@
           <a:p>
             <a:fld id="{F21E18F7-8D37-844F-A7E2-9E568A43F918}" type="datetime1">
               <a:rPr lang="en-US" smtClean="0"/>
-              <a:t>10/3/17</a:t>
+              <a:t>10/5/17</a:t>
             </a:fld>
             <a:endParaRPr lang="en-US"/>
           </a:p>
@@ -2795,7 +2799,7 @@
           <a:p>
             <a:fld id="{C01D5FDF-DEC6-8448-AE54-F498099D22E7}" type="datetime1">
               <a:rPr lang="en-US" smtClean="0"/>
-              <a:t>10/3/17</a:t>
+              <a:t>10/5/17</a:t>
             </a:fld>
             <a:endParaRPr lang="en-US"/>
           </a:p>
@@ -3008,7 +3012,7 @@
           <a:p>
             <a:fld id="{69230450-1C98-3B4F-BB2D-ACF9AC5FF464}" type="datetime1">
               <a:rPr lang="en-US" smtClean="0"/>
-              <a:t>10/3/17</a:t>
+              <a:t>10/5/17</a:t>
             </a:fld>
             <a:endParaRPr lang="en-US"/>
           </a:p>
@@ -3431,7 +3435,11 @@
           <a:p>
             <a:r>
               <a:rPr lang="en-US" dirty="0" smtClean="0"/>
-              <a:t>TensorFlow Scalability Test</a:t>
+              <a:t>TensorFlow Scalability </a:t>
+            </a:r>
+            <a:r>
+              <a:rPr lang="en-US" dirty="0" smtClean="0"/>
+              <a:t>Research</a:t>
             </a:r>
             <a:endParaRPr lang="en-US" dirty="0"/>
           </a:p>
@@ -3460,7 +3468,7 @@
           <a:p>
             <a:r>
               <a:rPr lang="en-US" dirty="0" smtClean="0"/>
-              <a:t>September 26</a:t>
+              <a:t>Oct 05</a:t>
             </a:r>
             <a:r>
               <a:rPr lang="en-US" baseline="30000" dirty="0" smtClean="0"/>
@@ -3478,6 +3486,738 @@
     <p:extLst>
       <p:ext uri="{BB962C8B-B14F-4D97-AF65-F5344CB8AC3E}">
         <p14:creationId xmlns:p14="http://schemas.microsoft.com/office/powerpoint/2010/main" val="350645553"/>
+      </p:ext>
+    </p:extLst>
+  </p:cSld>
+  <p:clrMapOvr>
+    <a:masterClrMapping/>
+  </p:clrMapOvr>
+</p:sld>
+</file>
+
+<file path=ppt/slides/slide10.xml><?xml version="1.0" encoding="utf-8"?>
+<p:sld xmlns:a="http://schemas.openxmlformats.org/drawingml/2006/main" xmlns:r="http://schemas.openxmlformats.org/officeDocument/2006/relationships" xmlns:p="http://schemas.openxmlformats.org/presentationml/2006/main">
+  <p:cSld>
+    <p:spTree>
+      <p:nvGrpSpPr>
+        <p:cNvPr id="1" name=""/>
+        <p:cNvGrpSpPr/>
+        <p:nvPr/>
+      </p:nvGrpSpPr>
+      <p:grpSpPr>
+        <a:xfrm>
+          <a:off x="0" y="0"/>
+          <a:ext cx="0" cy="0"/>
+          <a:chOff x="0" y="0"/>
+          <a:chExt cx="0" cy="0"/>
+        </a:xfrm>
+      </p:grpSpPr>
+      <p:sp>
+        <p:nvSpPr>
+          <p:cNvPr id="2" name="Title 1"/>
+          <p:cNvSpPr>
+            <a:spLocks noGrp="1"/>
+          </p:cNvSpPr>
+          <p:nvPr>
+            <p:ph type="title"/>
+          </p:nvPr>
+        </p:nvSpPr>
+        <p:spPr>
+          <a:xfrm>
+            <a:off x="0" y="1"/>
+            <a:ext cx="10515600" cy="630090"/>
+          </a:xfrm>
+        </p:spPr>
+        <p:txBody>
+          <a:bodyPr>
+            <a:normAutofit fontScale="90000"/>
+          </a:bodyPr>
+          <a:lstStyle/>
+          <a:p>
+            <a:r>
+              <a:rPr lang="en-US" dirty="0" smtClean="0"/>
+              <a:t>Test in HPC </a:t>
+            </a:r>
+            <a:r>
+              <a:rPr lang="en-US" smtClean="0"/>
+              <a:t>with Manually compiled Tensorflow</a:t>
+            </a:r>
+            <a:endParaRPr lang="en-US" dirty="0"/>
+          </a:p>
+        </p:txBody>
+      </p:sp>
+      <p:sp>
+        <p:nvSpPr>
+          <p:cNvPr id="4" name="Slide Number Placeholder 3"/>
+          <p:cNvSpPr>
+            <a:spLocks noGrp="1"/>
+          </p:cNvSpPr>
+          <p:nvPr>
+            <p:ph type="sldNum" sz="quarter" idx="12"/>
+          </p:nvPr>
+        </p:nvSpPr>
+        <p:spPr/>
+        <p:txBody>
+          <a:bodyPr/>
+          <a:lstStyle/>
+          <a:p>
+            <a:fld id="{C9BA8385-F9D7-7B47-B30A-D7457BD10BB9}" type="slidenum">
+              <a:rPr lang="en-US" smtClean="0"/>
+              <a:t>10</a:t>
+            </a:fld>
+            <a:endParaRPr lang="en-US"/>
+          </a:p>
+        </p:txBody>
+      </p:sp>
+      <p:pic>
+        <p:nvPicPr>
+          <p:cNvPr id="5" name="Picture 4"/>
+          <p:cNvPicPr>
+            <a:picLocks noChangeAspect="1"/>
+          </p:cNvPicPr>
+          <p:nvPr/>
+        </p:nvPicPr>
+        <p:blipFill>
+          <a:blip r:embed="rId2"/>
+          <a:stretch>
+            <a:fillRect/>
+          </a:stretch>
+        </p:blipFill>
+        <p:spPr>
+          <a:xfrm>
+            <a:off x="297595" y="708585"/>
+            <a:ext cx="5132063" cy="2933647"/>
+          </a:xfrm>
+          <a:prstGeom prst="rect">
+            <a:avLst/>
+          </a:prstGeom>
+        </p:spPr>
+      </p:pic>
+      <p:sp>
+        <p:nvSpPr>
+          <p:cNvPr id="6" name="TextBox 5"/>
+          <p:cNvSpPr txBox="1"/>
+          <p:nvPr/>
+        </p:nvSpPr>
+        <p:spPr>
+          <a:xfrm>
+            <a:off x="381000" y="3733800"/>
+            <a:ext cx="4687261" cy="2031325"/>
+          </a:xfrm>
+          <a:prstGeom prst="rect">
+            <a:avLst/>
+          </a:prstGeom>
+          <a:noFill/>
+        </p:spPr>
+        <p:txBody>
+          <a:bodyPr wrap="square" rtlCol="0">
+            <a:spAutoFit/>
+          </a:bodyPr>
+          <a:lstStyle/>
+          <a:p>
+            <a:pPr marL="342900" indent="-342900">
+              <a:buAutoNum type="arabicPlain"/>
+            </a:pPr>
+            <a:r>
+              <a:rPr lang="en-US" dirty="0" smtClean="0"/>
+              <a:t>This test all required 56 cores resource, but the program code </a:t>
+            </a:r>
+            <a:r>
+              <a:rPr lang="en-US" dirty="0" err="1" smtClean="0"/>
+              <a:t>configed</a:t>
+            </a:r>
+            <a:r>
+              <a:rPr lang="en-US" dirty="0" smtClean="0"/>
+              <a:t> how many threads to use;</a:t>
+            </a:r>
+          </a:p>
+          <a:p>
+            <a:pPr marL="342900" indent="-342900">
+              <a:buAutoNum type="arabicPlain"/>
+            </a:pPr>
+            <a:r>
+              <a:rPr lang="en-US" dirty="0" smtClean="0"/>
+              <a:t>Single thread has the maximum speed;</a:t>
+            </a:r>
+          </a:p>
+          <a:p>
+            <a:pPr marL="342900" indent="-342900">
+              <a:buAutoNum type="arabicPlain"/>
+            </a:pPr>
+            <a:r>
+              <a:rPr lang="en-US" dirty="0" smtClean="0"/>
+              <a:t>Test date: Oct 04</a:t>
+            </a:r>
+            <a:r>
+              <a:rPr lang="en-US" baseline="30000" dirty="0" smtClean="0"/>
+              <a:t>th</a:t>
+            </a:r>
+            <a:r>
+              <a:rPr lang="en-US" dirty="0" smtClean="0"/>
+              <a:t>, 2017</a:t>
+            </a:r>
+          </a:p>
+          <a:p>
+            <a:pPr marL="342900" indent="-342900">
+              <a:buAutoNum type="arabicPlain"/>
+            </a:pPr>
+            <a:endParaRPr lang="en-US" dirty="0" smtClean="0"/>
+          </a:p>
+          <a:p>
+            <a:pPr marL="342900" indent="-342900">
+              <a:buAutoNum type="arabicPlain"/>
+            </a:pPr>
+            <a:endParaRPr lang="en-US" dirty="0"/>
+          </a:p>
+        </p:txBody>
+      </p:sp>
+      <p:sp>
+        <p:nvSpPr>
+          <p:cNvPr id="7" name="TextBox 6"/>
+          <p:cNvSpPr txBox="1"/>
+          <p:nvPr/>
+        </p:nvSpPr>
+        <p:spPr>
+          <a:xfrm>
+            <a:off x="6096642" y="3817044"/>
+            <a:ext cx="4687261" cy="1200329"/>
+          </a:xfrm>
+          <a:prstGeom prst="rect">
+            <a:avLst/>
+          </a:prstGeom>
+          <a:noFill/>
+        </p:spPr>
+        <p:txBody>
+          <a:bodyPr wrap="square" rtlCol="0">
+            <a:spAutoFit/>
+          </a:bodyPr>
+          <a:lstStyle/>
+          <a:p>
+            <a:pPr marL="342900" indent="-342900">
+              <a:buAutoNum type="arabicPlain"/>
+            </a:pPr>
+            <a:r>
+              <a:rPr lang="en-US" dirty="0" smtClean="0"/>
+              <a:t>This test required specific cores resource,  according to program code </a:t>
+            </a:r>
+            <a:r>
+              <a:rPr lang="en-US" dirty="0" err="1" smtClean="0"/>
+              <a:t>config</a:t>
+            </a:r>
+            <a:r>
+              <a:rPr lang="en-US" dirty="0" smtClean="0"/>
+              <a:t>;</a:t>
+            </a:r>
+          </a:p>
+          <a:p>
+            <a:pPr marL="342900" indent="-342900">
+              <a:buAutoNum type="arabicPlain"/>
+            </a:pPr>
+            <a:endParaRPr lang="en-US" dirty="0" smtClean="0"/>
+          </a:p>
+          <a:p>
+            <a:pPr marL="342900" indent="-342900">
+              <a:buAutoNum type="arabicPlain"/>
+            </a:pPr>
+            <a:r>
+              <a:rPr lang="en-US" dirty="0" smtClean="0"/>
+              <a:t>Test date: Oct 04</a:t>
+            </a:r>
+            <a:r>
+              <a:rPr lang="en-US" baseline="30000" dirty="0" smtClean="0"/>
+              <a:t>th</a:t>
+            </a:r>
+            <a:r>
+              <a:rPr lang="en-US" dirty="0" smtClean="0"/>
+              <a:t>, 2017</a:t>
+            </a:r>
+            <a:endParaRPr lang="en-US" dirty="0"/>
+          </a:p>
+        </p:txBody>
+      </p:sp>
+    </p:spTree>
+    <p:extLst>
+      <p:ext uri="{BB962C8B-B14F-4D97-AF65-F5344CB8AC3E}">
+        <p14:creationId xmlns:p14="http://schemas.microsoft.com/office/powerpoint/2010/main" val="407664619"/>
+      </p:ext>
+    </p:extLst>
+  </p:cSld>
+  <p:clrMapOvr>
+    <a:masterClrMapping/>
+  </p:clrMapOvr>
+</p:sld>
+</file>
+
+<file path=ppt/slides/slide11.xml><?xml version="1.0" encoding="utf-8"?>
+<p:sld xmlns:a="http://schemas.openxmlformats.org/drawingml/2006/main" xmlns:r="http://schemas.openxmlformats.org/officeDocument/2006/relationships" xmlns:p="http://schemas.openxmlformats.org/presentationml/2006/main">
+  <p:cSld>
+    <p:spTree>
+      <p:nvGrpSpPr>
+        <p:cNvPr id="1" name=""/>
+        <p:cNvGrpSpPr/>
+        <p:nvPr/>
+      </p:nvGrpSpPr>
+      <p:grpSpPr>
+        <a:xfrm>
+          <a:off x="0" y="0"/>
+          <a:ext cx="0" cy="0"/>
+          <a:chOff x="0" y="0"/>
+          <a:chExt cx="0" cy="0"/>
+        </a:xfrm>
+      </p:grpSpPr>
+      <p:sp>
+        <p:nvSpPr>
+          <p:cNvPr id="2" name="Title 1"/>
+          <p:cNvSpPr>
+            <a:spLocks noGrp="1"/>
+          </p:cNvSpPr>
+          <p:nvPr>
+            <p:ph type="title"/>
+          </p:nvPr>
+        </p:nvSpPr>
+        <p:spPr>
+          <a:xfrm>
+            <a:off x="0" y="0"/>
+            <a:ext cx="10515600" cy="596409"/>
+          </a:xfrm>
+        </p:spPr>
+        <p:txBody>
+          <a:bodyPr>
+            <a:normAutofit fontScale="90000"/>
+          </a:bodyPr>
+          <a:lstStyle/>
+          <a:p>
+            <a:r>
+              <a:rPr lang="en-US" dirty="0" smtClean="0"/>
+              <a:t>Tensorflow Optimization on CPU</a:t>
+            </a:r>
+            <a:endParaRPr lang="en-US" dirty="0"/>
+          </a:p>
+        </p:txBody>
+      </p:sp>
+      <p:sp>
+        <p:nvSpPr>
+          <p:cNvPr id="4" name="Slide Number Placeholder 3"/>
+          <p:cNvSpPr>
+            <a:spLocks noGrp="1"/>
+          </p:cNvSpPr>
+          <p:nvPr>
+            <p:ph type="sldNum" sz="quarter" idx="12"/>
+          </p:nvPr>
+        </p:nvSpPr>
+        <p:spPr/>
+        <p:txBody>
+          <a:bodyPr/>
+          <a:lstStyle/>
+          <a:p>
+            <a:fld id="{C9BA8385-F9D7-7B47-B30A-D7457BD10BB9}" type="slidenum">
+              <a:rPr lang="en-US" smtClean="0"/>
+              <a:t>11</a:t>
+            </a:fld>
+            <a:endParaRPr lang="en-US"/>
+          </a:p>
+        </p:txBody>
+      </p:sp>
+      <p:sp>
+        <p:nvSpPr>
+          <p:cNvPr id="5" name="Rectangle 4"/>
+          <p:cNvSpPr/>
+          <p:nvPr/>
+        </p:nvSpPr>
+        <p:spPr>
+          <a:xfrm>
+            <a:off x="311085" y="1305342"/>
+            <a:ext cx="11528981" cy="3139321"/>
+          </a:xfrm>
+          <a:prstGeom prst="rect">
+            <a:avLst/>
+          </a:prstGeom>
+        </p:spPr>
+        <p:txBody>
+          <a:bodyPr wrap="square">
+            <a:spAutoFit/>
+          </a:bodyPr>
+          <a:lstStyle/>
+          <a:p>
+            <a:pPr marL="342900" indent="-342900">
+              <a:buFont typeface="+mj-lt"/>
+              <a:buAutoNum type="arabicPeriod"/>
+            </a:pPr>
+            <a:r>
+              <a:rPr lang="en-US" dirty="0" smtClean="0">
+                <a:solidFill>
+                  <a:srgbClr val="222222"/>
+                </a:solidFill>
+                <a:latin typeface="arial" charset="0"/>
+              </a:rPr>
+              <a:t>The </a:t>
+            </a:r>
+            <a:r>
+              <a:rPr lang="en-US" dirty="0">
+                <a:solidFill>
+                  <a:srgbClr val="222222"/>
+                </a:solidFill>
+                <a:latin typeface="arial" charset="0"/>
+              </a:rPr>
+              <a:t>important basis: "</a:t>
+            </a:r>
+            <a:r>
+              <a:rPr lang="en-US" dirty="0">
+                <a:solidFill>
+                  <a:srgbClr val="222222"/>
+                </a:solidFill>
+                <a:latin typeface="Roboto" charset="0"/>
+              </a:rPr>
+              <a:t>CPUs, which includes Intel® Xeon Phi™, achieve optimal performance when TensorFlow is </a:t>
+            </a:r>
+            <a:r>
+              <a:rPr lang="en-US" dirty="0">
+                <a:solidFill>
+                  <a:srgbClr val="1155CC"/>
+                </a:solidFill>
+                <a:latin typeface="Roboto" charset="0"/>
+                <a:hlinkClick r:id="rId2"/>
+              </a:rPr>
+              <a:t>built from source</a:t>
+            </a:r>
+            <a:r>
+              <a:rPr lang="en-US" dirty="0">
+                <a:solidFill>
+                  <a:srgbClr val="222222"/>
+                </a:solidFill>
+                <a:latin typeface="Roboto" charset="0"/>
+              </a:rPr>
+              <a:t> with all of the instructions supported by the target CPU</a:t>
+            </a:r>
+            <a:r>
+              <a:rPr lang="en-US" dirty="0" smtClean="0">
+                <a:solidFill>
+                  <a:srgbClr val="222222"/>
+                </a:solidFill>
+                <a:latin typeface="Roboto" charset="0"/>
+              </a:rPr>
+              <a:t>.</a:t>
+            </a:r>
+            <a:r>
+              <a:rPr lang="en-US" dirty="0" smtClean="0">
+                <a:solidFill>
+                  <a:srgbClr val="222222"/>
+                </a:solidFill>
+                <a:latin typeface="arial" charset="0"/>
+              </a:rPr>
+              <a:t>”</a:t>
+            </a:r>
+          </a:p>
+          <a:p>
+            <a:pPr marL="342900" indent="-342900">
+              <a:buFont typeface="+mj-lt"/>
+              <a:buAutoNum type="arabicPeriod"/>
+            </a:pPr>
+            <a:r>
+              <a:rPr lang="en-US" dirty="0" smtClean="0">
+                <a:solidFill>
+                  <a:srgbClr val="222222"/>
+                </a:solidFill>
+                <a:latin typeface="Roboto" charset="0"/>
+              </a:rPr>
+              <a:t>configuration </a:t>
+            </a:r>
+            <a:r>
+              <a:rPr lang="en-US" dirty="0">
+                <a:solidFill>
+                  <a:srgbClr val="222222"/>
+                </a:solidFill>
+                <a:latin typeface="Roboto" charset="0"/>
+              </a:rPr>
+              <a:t>options (</a:t>
+            </a:r>
+            <a:r>
+              <a:rPr lang="en-US" dirty="0" err="1">
+                <a:solidFill>
+                  <a:srgbClr val="222222"/>
+                </a:solidFill>
+                <a:latin typeface="Roboto Mono" charset="0"/>
+              </a:rPr>
+              <a:t>intra_op_parallelism_threads</a:t>
+            </a:r>
+            <a:r>
+              <a:rPr lang="en-US" dirty="0">
+                <a:solidFill>
+                  <a:srgbClr val="222222"/>
+                </a:solidFill>
+                <a:latin typeface="Roboto Mono" charset="0"/>
+              </a:rPr>
+              <a:t>, </a:t>
+            </a:r>
+            <a:r>
+              <a:rPr lang="en-US" dirty="0" err="1">
+                <a:solidFill>
+                  <a:srgbClr val="222222"/>
+                </a:solidFill>
+                <a:latin typeface="Roboto Mono" charset="0"/>
+              </a:rPr>
+              <a:t>inter_op_parallelism_threads</a:t>
+            </a:r>
+            <a:r>
+              <a:rPr lang="en-US" dirty="0">
+                <a:solidFill>
+                  <a:srgbClr val="222222"/>
+                </a:solidFill>
+                <a:latin typeface="Roboto" charset="0"/>
+              </a:rPr>
+              <a:t>), if they are unset or set to 0, will default to the number of logical CPU cores; A common alternative optimization is to set the number of threads in both pools equal to the number of physical cores rather than logical cores.</a:t>
+            </a:r>
+            <a:endParaRPr lang="en-US" dirty="0">
+              <a:solidFill>
+                <a:srgbClr val="222222"/>
+              </a:solidFill>
+              <a:latin typeface="arial" charset="0"/>
+            </a:endParaRPr>
+          </a:p>
+          <a:p>
+            <a:pPr marL="342900" indent="-342900">
+              <a:buFont typeface="+mj-lt"/>
+              <a:buAutoNum type="arabicPeriod"/>
+            </a:pPr>
+            <a:r>
+              <a:rPr lang="en-US" dirty="0" smtClean="0">
+                <a:solidFill>
+                  <a:srgbClr val="222222"/>
+                </a:solidFill>
+                <a:latin typeface="Roboto" charset="0"/>
+              </a:rPr>
+              <a:t>Tuning </a:t>
+            </a:r>
+            <a:r>
+              <a:rPr lang="en-US" dirty="0">
+                <a:solidFill>
+                  <a:srgbClr val="222222"/>
+                </a:solidFill>
+                <a:latin typeface="Roboto" charset="0"/>
+              </a:rPr>
+              <a:t>MKL for the best performance, set </a:t>
+            </a:r>
+            <a:r>
+              <a:rPr lang="en-US" dirty="0">
+                <a:solidFill>
+                  <a:srgbClr val="212121"/>
+                </a:solidFill>
+                <a:latin typeface="Roboto" charset="0"/>
+              </a:rPr>
+              <a:t>KMP_BLOCKTIME  and NCHW </a:t>
+            </a:r>
+            <a:r>
+              <a:rPr lang="en-US" dirty="0" smtClean="0">
+                <a:solidFill>
+                  <a:srgbClr val="212121"/>
+                </a:solidFill>
+                <a:latin typeface="Roboto" charset="0"/>
+              </a:rPr>
+              <a:t>etc. </a:t>
+            </a:r>
+            <a:r>
+              <a:rPr lang="en-US" dirty="0">
+                <a:solidFill>
+                  <a:srgbClr val="212121"/>
+                </a:solidFill>
+                <a:latin typeface="Roboto" charset="0"/>
+              </a:rPr>
+              <a:t>parameters. </a:t>
+            </a:r>
+            <a:r>
+              <a:rPr lang="en-US" dirty="0">
+                <a:solidFill>
+                  <a:srgbClr val="000000"/>
+                </a:solidFill>
+                <a:latin typeface="Roboto" charset="0"/>
+              </a:rPr>
+              <a:t>but MKL was added as of TensorFlow 1.2 and currently only works on Linux</a:t>
+            </a:r>
+            <a:r>
+              <a:rPr lang="en-US" dirty="0" smtClean="0">
+                <a:solidFill>
+                  <a:srgbClr val="000000"/>
+                </a:solidFill>
+                <a:latin typeface="Roboto" charset="0"/>
+              </a:rPr>
+              <a:t>.</a:t>
+            </a:r>
+          </a:p>
+          <a:p>
+            <a:pPr marL="342900" indent="-342900">
+              <a:buFont typeface="+mj-lt"/>
+              <a:buAutoNum type="arabicPeriod"/>
+            </a:pPr>
+            <a:r>
+              <a:rPr lang="en-US" dirty="0">
+                <a:solidFill>
+                  <a:srgbClr val="222222"/>
+                </a:solidFill>
+                <a:latin typeface="Roboto" charset="0"/>
+              </a:rPr>
+              <a:t>Tensorflow optimization is specific-application-related: " For models like </a:t>
+            </a:r>
+            <a:r>
+              <a:rPr lang="en-US" dirty="0" err="1">
+                <a:solidFill>
+                  <a:srgbClr val="222222"/>
+                </a:solidFill>
+                <a:latin typeface="Roboto" charset="0"/>
+              </a:rPr>
+              <a:t>ResNet</a:t>
+            </a:r>
+            <a:r>
+              <a:rPr lang="en-US" dirty="0">
+                <a:solidFill>
+                  <a:srgbClr val="222222"/>
+                </a:solidFill>
+                <a:latin typeface="Roboto" charset="0"/>
+              </a:rPr>
+              <a:t> and InceptionV3, placing variables on the CPU is the optimal setting, but for models with a lot of variables like </a:t>
+            </a:r>
+            <a:r>
+              <a:rPr lang="en-US" dirty="0" err="1">
+                <a:solidFill>
+                  <a:srgbClr val="222222"/>
+                </a:solidFill>
+                <a:latin typeface="Roboto" charset="0"/>
+              </a:rPr>
+              <a:t>AlexNet</a:t>
+            </a:r>
+            <a:r>
+              <a:rPr lang="en-US" dirty="0">
+                <a:solidFill>
+                  <a:srgbClr val="222222"/>
+                </a:solidFill>
+                <a:latin typeface="Roboto" charset="0"/>
+              </a:rPr>
+              <a:t> and VGG, using GPUs </a:t>
+            </a:r>
+            <a:r>
+              <a:rPr lang="en-US" dirty="0" err="1">
+                <a:solidFill>
+                  <a:srgbClr val="222222"/>
+                </a:solidFill>
+                <a:latin typeface="Roboto" charset="0"/>
+              </a:rPr>
+              <a:t>withNCCL</a:t>
+            </a:r>
+            <a:r>
+              <a:rPr lang="en-US" dirty="0">
+                <a:solidFill>
+                  <a:srgbClr val="222222"/>
+                </a:solidFill>
+                <a:latin typeface="Roboto" charset="0"/>
+              </a:rPr>
+              <a:t> is better." </a:t>
+            </a:r>
+            <a:endParaRPr lang="en-US" dirty="0" smtClean="0">
+              <a:solidFill>
+                <a:srgbClr val="222222"/>
+              </a:solidFill>
+              <a:latin typeface="Roboto" charset="0"/>
+            </a:endParaRPr>
+          </a:p>
+          <a:p>
+            <a:pPr marL="342900" indent="-342900">
+              <a:buFont typeface="+mj-lt"/>
+              <a:buAutoNum type="arabicPeriod"/>
+            </a:pPr>
+            <a:endParaRPr lang="en-US" b="0" i="0" dirty="0">
+              <a:solidFill>
+                <a:srgbClr val="222222"/>
+              </a:solidFill>
+              <a:effectLst/>
+              <a:latin typeface="arial" charset="0"/>
+            </a:endParaRPr>
+          </a:p>
+        </p:txBody>
+      </p:sp>
+    </p:spTree>
+    <p:extLst>
+      <p:ext uri="{BB962C8B-B14F-4D97-AF65-F5344CB8AC3E}">
+        <p14:creationId xmlns:p14="http://schemas.microsoft.com/office/powerpoint/2010/main" val="825001765"/>
+      </p:ext>
+    </p:extLst>
+  </p:cSld>
+  <p:clrMapOvr>
+    <a:masterClrMapping/>
+  </p:clrMapOvr>
+</p:sld>
+</file>
+
+<file path=ppt/slides/slide12.xml><?xml version="1.0" encoding="utf-8"?>
+<p:sld xmlns:a="http://schemas.openxmlformats.org/drawingml/2006/main" xmlns:r="http://schemas.openxmlformats.org/officeDocument/2006/relationships" xmlns:p="http://schemas.openxmlformats.org/presentationml/2006/main">
+  <p:cSld>
+    <p:spTree>
+      <p:nvGrpSpPr>
+        <p:cNvPr id="1" name=""/>
+        <p:cNvGrpSpPr/>
+        <p:nvPr/>
+      </p:nvGrpSpPr>
+      <p:grpSpPr>
+        <a:xfrm>
+          <a:off x="0" y="0"/>
+          <a:ext cx="0" cy="0"/>
+          <a:chOff x="0" y="0"/>
+          <a:chExt cx="0" cy="0"/>
+        </a:xfrm>
+      </p:grpSpPr>
+      <p:sp>
+        <p:nvSpPr>
+          <p:cNvPr id="2" name="Title 1"/>
+          <p:cNvSpPr>
+            <a:spLocks noGrp="1"/>
+          </p:cNvSpPr>
+          <p:nvPr>
+            <p:ph type="title"/>
+          </p:nvPr>
+        </p:nvSpPr>
+        <p:spPr>
+          <a:xfrm>
+            <a:off x="4844593" y="2514438"/>
+            <a:ext cx="2828826" cy="756664"/>
+          </a:xfrm>
+        </p:spPr>
+        <p:txBody>
+          <a:bodyPr/>
+          <a:lstStyle/>
+          <a:p>
+            <a:r>
+              <a:rPr lang="en-US" smtClean="0"/>
+              <a:t>Thank you</a:t>
+            </a:r>
+            <a:endParaRPr lang="en-US" dirty="0"/>
+          </a:p>
+        </p:txBody>
+      </p:sp>
+      <p:sp>
+        <p:nvSpPr>
+          <p:cNvPr id="4" name="Slide Number Placeholder 3"/>
+          <p:cNvSpPr>
+            <a:spLocks noGrp="1"/>
+          </p:cNvSpPr>
+          <p:nvPr>
+            <p:ph type="sldNum" sz="quarter" idx="12"/>
+          </p:nvPr>
+        </p:nvSpPr>
+        <p:spPr/>
+        <p:txBody>
+          <a:bodyPr/>
+          <a:lstStyle/>
+          <a:p>
+            <a:fld id="{C9BA8385-F9D7-7B47-B30A-D7457BD10BB9}" type="slidenum">
+              <a:rPr lang="en-US" smtClean="0"/>
+              <a:t>12</a:t>
+            </a:fld>
+            <a:endParaRPr lang="en-US"/>
+          </a:p>
+        </p:txBody>
+      </p:sp>
+    </p:spTree>
+    <p:extLst>
+      <p:ext uri="{BB962C8B-B14F-4D97-AF65-F5344CB8AC3E}">
+        <p14:creationId xmlns:p14="http://schemas.microsoft.com/office/powerpoint/2010/main" val="143562469"/>
       </p:ext>
     </p:extLst>
   </p:cSld>
@@ -3516,7 +4256,7 @@
         </p:nvSpPr>
         <p:spPr>
           <a:xfrm>
-            <a:off x="0" y="1"/>
+            <a:off x="0" y="0"/>
             <a:ext cx="10515600" cy="669302"/>
           </a:xfrm>
         </p:spPr>
@@ -3552,7 +4292,7 @@
         </p:spPr>
         <p:txBody>
           <a:bodyPr>
-            <a:normAutofit/>
+            <a:normAutofit fontScale="92500"/>
           </a:bodyPr>
           <a:lstStyle/>
           <a:p>
@@ -3574,8 +4314,19 @@
           <a:p>
             <a:r>
               <a:rPr lang="en-US" dirty="0" smtClean="0"/>
-              <a:t>Input layer: 54 nodes with normalized MRI Brain gray pixel value;</a:t>
-            </a:r>
+              <a:t>Input layer: 54 nodes with normalized MRI Brain gray pixel </a:t>
+            </a:r>
+            <a:r>
+              <a:rPr lang="en-US" dirty="0" smtClean="0"/>
+              <a:t>value, in which 3*3*3  T1 cubic image and 3*3*3 T2 cubic image in same physical coordinates;</a:t>
+            </a:r>
+          </a:p>
+          <a:p>
+            <a:r>
+              <a:rPr lang="en-US" dirty="0" smtClean="0"/>
+              <a:t>Ground Truth: 26 categories label file with same physical coordinates with T1 image; </a:t>
+            </a:r>
+            <a:endParaRPr lang="en-US" dirty="0" smtClean="0"/>
           </a:p>
           <a:p>
             <a:r>
@@ -3709,7 +4460,19 @@
           <a:p>
             <a:r>
               <a:rPr lang="en-US" dirty="0" smtClean="0"/>
-              <a:t>Test Environment in Argon HPC</a:t>
+              <a:t>Test Environment </a:t>
+            </a:r>
+            <a:r>
+              <a:rPr lang="en-US" dirty="0" smtClean="0"/>
+              <a:t> in </a:t>
+            </a:r>
+            <a:r>
+              <a:rPr lang="en-US" dirty="0" smtClean="0"/>
+              <a:t>Argon </a:t>
+            </a:r>
+            <a:r>
+              <a:rPr lang="en-US" dirty="0" smtClean="0"/>
+              <a:t>HPC -1</a:t>
             </a:r>
             <a:endParaRPr lang="en-US" dirty="0"/>
           </a:p>
@@ -3945,8 +4708,13 @@
           <a:p>
             <a:r>
               <a:rPr lang="en-US" dirty="0" smtClean="0"/>
-              <a:t>Run command: </a:t>
-            </a:r>
+              <a:t>Run </a:t>
+            </a:r>
+            <a:r>
+              <a:rPr lang="en-US" dirty="0" smtClean="0"/>
+              <a:t>command line: </a:t>
+            </a:r>
+            <a:endParaRPr lang="en-US" dirty="0" smtClean="0"/>
           </a:p>
           <a:p>
             <a:pPr marL="457200" lvl="1" indent="0">
@@ -4046,21 +4814,25 @@
         </p:nvSpPr>
         <p:spPr>
           <a:xfrm>
-            <a:off x="0" y="131975"/>
-            <a:ext cx="12094590" cy="424206"/>
+            <a:off x="0" y="0"/>
+            <a:ext cx="10515600" cy="681250"/>
           </a:xfrm>
         </p:spPr>
         <p:txBody>
           <a:bodyPr>
-            <a:noAutofit/>
+            <a:normAutofit fontScale="90000"/>
           </a:bodyPr>
           <a:lstStyle/>
           <a:p>
             <a:r>
-              <a:rPr lang="en-US" sz="2800" dirty="0" smtClean="0"/>
-              <a:t>Test Environment in Local Server Putamen with Intel Compiled Tensorflow</a:t>
-            </a:r>
-            <a:endParaRPr lang="en-US" sz="2800" dirty="0"/>
+              <a:rPr lang="en-US" dirty="0" smtClean="0"/>
+              <a:t>Test Environment in Argon </a:t>
+            </a:r>
+            <a:r>
+              <a:rPr lang="en-US" dirty="0" smtClean="0"/>
+              <a:t>HPC -2</a:t>
+            </a:r>
+            <a:endParaRPr lang="en-US" dirty="0"/>
           </a:p>
         </p:txBody>
       </p:sp>
@@ -4082,17 +4854,21 @@
         </p:spPr>
         <p:txBody>
           <a:bodyPr>
-            <a:normAutofit fontScale="92500" lnSpcReduction="20000"/>
+            <a:normAutofit fontScale="85000" lnSpcReduction="20000"/>
           </a:bodyPr>
           <a:lstStyle/>
           <a:p>
             <a:r>
-              <a:rPr lang="en-US" dirty="0" err="1" smtClean="0"/>
-              <a:t>maxOS</a:t>
-            </a:r>
-            <a:r>
-              <a:rPr lang="en-US" dirty="0" smtClean="0"/>
-              <a:t> Sierra 10.12.6</a:t>
+              <a:rPr lang="en-US" dirty="0" smtClean="0"/>
+              <a:t>Linux-64  Red </a:t>
+            </a:r>
+            <a:r>
+              <a:rPr lang="en-US" dirty="0"/>
+              <a:t>Hat </a:t>
+            </a:r>
+            <a:r>
+              <a:rPr lang="en-US" dirty="0" smtClean="0"/>
+              <a:t>4.8.2-15</a:t>
             </a:r>
             <a:endParaRPr lang="en-US" dirty="0"/>
           </a:p>
@@ -4104,119 +4880,158 @@
           </a:p>
           <a:p>
             <a:r>
-              <a:rPr lang="en-US" dirty="0" smtClean="0"/>
-              <a:t>Intel compiled Tensorflow 1.1.1</a:t>
-            </a:r>
+              <a:rPr lang="en-US" dirty="0"/>
+              <a:t>Manually compiled Tensorflow master branch in </a:t>
+            </a:r>
+            <a:r>
+              <a:rPr lang="en-US" dirty="0" err="1"/>
+              <a:t>Github</a:t>
+            </a:r>
+            <a:endParaRPr lang="en-US" dirty="0"/>
           </a:p>
           <a:p>
             <a:pPr marL="457200" lvl="1" indent="0">
               <a:buNone/>
             </a:pPr>
             <a:r>
-              <a:rPr lang="en-US" dirty="0" smtClean="0"/>
+              <a:rPr lang="en-US" dirty="0"/>
               <a:t>URL:  </a:t>
             </a:r>
             <a:r>
               <a:rPr lang="en-US" dirty="0">
                 <a:hlinkClick r:id="rId2"/>
               </a:rPr>
-              <a:t>https://</a:t>
-            </a:r>
-            <a:r>
-              <a:rPr lang="en-US" dirty="0" smtClean="0">
-                <a:hlinkClick r:id="rId2"/>
-              </a:rPr>
-              <a:t>repo.continuum.io/pkgs/free/osx-64/tensorflow-1.1.0-np112py36_0.tar.bz2</a:t>
-            </a:r>
-            <a:endParaRPr lang="en-US" dirty="0" smtClean="0"/>
+              <a:t>https://github.com/tensorflow/tensorflow</a:t>
+            </a:r>
+            <a:r>
+              <a:rPr lang="en-US" dirty="0"/>
+              <a:t> </a:t>
+            </a:r>
+            <a:r>
+              <a:rPr lang="en-US" dirty="0" smtClean="0"/>
+              <a:t>(Oct 3th,2017 </a:t>
+            </a:r>
+            <a:r>
+              <a:rPr lang="en-US" dirty="0"/>
+              <a:t>version)</a:t>
+            </a:r>
           </a:p>
           <a:p>
             <a:pPr marL="457200" lvl="1" indent="0">
               <a:buNone/>
             </a:pPr>
             <a:r>
+              <a:rPr lang="en-US" dirty="0" err="1"/>
+              <a:t>Bazel</a:t>
+            </a:r>
+            <a:r>
+              <a:rPr lang="en-US" dirty="0"/>
+              <a:t> compile:</a:t>
+            </a:r>
+          </a:p>
+          <a:p>
+            <a:pPr marL="1371600" lvl="3" indent="0">
+              <a:buNone/>
+            </a:pPr>
+            <a:r>
+              <a:rPr lang="en-US" sz="1600" dirty="0" err="1"/>
+              <a:t>bazel</a:t>
+            </a:r>
+            <a:r>
+              <a:rPr lang="en-US" sz="1600" dirty="0"/>
+              <a:t> build --</a:t>
+            </a:r>
+            <a:r>
+              <a:rPr lang="en-US" sz="1600" dirty="0" err="1"/>
+              <a:t>config</a:t>
+            </a:r>
+            <a:r>
+              <a:rPr lang="en-US" sz="1600" dirty="0"/>
+              <a:t>=</a:t>
+            </a:r>
+            <a:r>
+              <a:rPr lang="en-US" sz="1600" dirty="0" err="1"/>
+              <a:t>mkl</a:t>
+            </a:r>
+            <a:r>
+              <a:rPr lang="en-US" sz="1600" dirty="0"/>
+              <a:t> --</a:t>
+            </a:r>
+            <a:r>
+              <a:rPr lang="en-US" sz="1600" dirty="0" err="1"/>
+              <a:t>copt</a:t>
+            </a:r>
+            <a:r>
+              <a:rPr lang="en-US" sz="1600" dirty="0"/>
+              <a:t>="-DEIGEN_USE_VML" -c opt //</a:t>
+            </a:r>
+            <a:r>
+              <a:rPr lang="en-US" sz="1600" dirty="0" err="1" smtClean="0"/>
+              <a:t>tensorflow</a:t>
+            </a:r>
+            <a:r>
+              <a:rPr lang="en-US" sz="1600" dirty="0" smtClean="0"/>
+              <a:t>/tools/</a:t>
+            </a:r>
+            <a:r>
+              <a:rPr lang="en-US" sz="1600" dirty="0" err="1" smtClean="0"/>
+              <a:t>pip_package:build_pip_package</a:t>
+            </a:r>
+            <a:endParaRPr lang="en-US" sz="1600" dirty="0" smtClean="0"/>
+          </a:p>
+          <a:p>
+            <a:pPr marL="458788" lvl="3" indent="0">
+              <a:buNone/>
+            </a:pPr>
+            <a:r>
               <a:rPr lang="en-US" dirty="0" smtClean="0"/>
               <a:t>This </a:t>
             </a:r>
             <a:r>
-              <a:rPr lang="en-US" dirty="0" err="1"/>
-              <a:t>C</a:t>
-            </a:r>
-            <a:r>
-              <a:rPr lang="en-US" dirty="0" err="1" smtClean="0"/>
-              <a:t>onda</a:t>
-            </a:r>
-            <a:r>
-              <a:rPr lang="en-US" dirty="0" smtClean="0"/>
-              <a:t> Tensorflow library </a:t>
-            </a:r>
-            <a:r>
-              <a:rPr lang="en-US" sz="2800" b="1" dirty="0" err="1" smtClean="0">
+              <a:rPr lang="en-US" dirty="0"/>
+              <a:t>manually compiled Tensorflow </a:t>
+            </a:r>
+            <a:r>
+              <a:rPr lang="en-US" dirty="0"/>
+              <a:t>library </a:t>
+            </a:r>
+            <a:r>
+              <a:rPr lang="en-US" sz="2100" b="1" dirty="0">
                 <a:solidFill>
                   <a:schemeClr val="accent1"/>
                 </a:solidFill>
               </a:rPr>
-              <a:t>wasn</a:t>
-            </a:r>
-            <a:r>
-              <a:rPr lang="mr-IN" sz="2800" b="1" dirty="0" smtClean="0">
+              <a:t>doesn’t uses </a:t>
+            </a:r>
+            <a:r>
+              <a:rPr lang="en-US" sz="2100" b="1" dirty="0">
                 <a:solidFill>
                   <a:schemeClr val="accent1"/>
                 </a:solidFill>
               </a:rPr>
-              <a:t>’</a:t>
-            </a:r>
-            <a:r>
-              <a:rPr lang="en-US" sz="2800" b="1" dirty="0" smtClean="0">
-                <a:solidFill>
-                  <a:schemeClr val="accent1"/>
-                </a:solidFill>
-              </a:rPr>
-              <a:t>t</a:t>
-            </a:r>
-            <a:r>
-              <a:rPr lang="en-US" dirty="0" smtClean="0"/>
-              <a:t> compiled to use below instructions:</a:t>
-            </a:r>
-          </a:p>
-          <a:p>
-            <a:pPr marL="457200" lvl="1" indent="0">
-              <a:buNone/>
-            </a:pPr>
-            <a:r>
-              <a:rPr lang="en-US" dirty="0" smtClean="0">
-                <a:solidFill>
-                  <a:schemeClr val="accent1"/>
-                </a:solidFill>
-              </a:rPr>
-              <a:t>SSE4.1 and SSE4.2</a:t>
-            </a:r>
-            <a:r>
-              <a:rPr lang="en-US" dirty="0" smtClean="0"/>
-              <a:t>: Streaming SIMD Extensions 4 is a SIMD CPU instruction set used in the Intel Core microarchitecture and AMD K10 (K8L);</a:t>
-            </a:r>
-          </a:p>
-          <a:p>
-            <a:pPr marL="457200" lvl="1" indent="0">
-              <a:buNone/>
-            </a:pPr>
-            <a:r>
-              <a:rPr lang="en-US" dirty="0" smtClean="0">
-                <a:solidFill>
-                  <a:schemeClr val="accent1"/>
-                </a:solidFill>
-              </a:rPr>
-              <a:t>AVX and AVX2</a:t>
-            </a:r>
-            <a:r>
-              <a:rPr lang="en-US" dirty="0" smtClean="0"/>
-              <a:t>:  Advanced Vector Extensions are extensions to the x86 instruction set architecture for microprocessors from Intel and AMD</a:t>
+              <a:t>SSE, AVX, FMA </a:t>
+            </a:r>
+            <a:r>
+              <a:rPr lang="en-US" dirty="0"/>
+              <a:t>instruction set, </a:t>
+            </a:r>
+            <a:r>
+              <a:rPr lang="en-US" dirty="0" smtClean="0"/>
+              <a:t>with </a:t>
+            </a:r>
+            <a:r>
+              <a:rPr lang="en-US" dirty="0"/>
+              <a:t>using Intel MKL.</a:t>
             </a:r>
           </a:p>
           <a:p>
             <a:r>
               <a:rPr lang="is-IS" dirty="0" smtClean="0"/>
-              <a:t>Intel mkl 2017.0.3: </a:t>
+              <a:t>Intel </a:t>
+            </a:r>
+            <a:r>
+              <a:rPr lang="is-IS" dirty="0" smtClean="0"/>
+              <a:t>mkl 2018.0.0: </a:t>
             </a:r>
             <a:r>
               <a:rPr lang="en-US" dirty="0" smtClean="0"/>
@@ -4228,9 +5043,26 @@
             </a:r>
             <a:r>
               <a:rPr lang="is-IS" dirty="0"/>
-              <a:t>  </a:t>
-            </a:r>
-            <a:endParaRPr lang="is-IS" dirty="0" smtClean="0"/>
+              <a:t>   </a:t>
+            </a:r>
+          </a:p>
+          <a:p>
+            <a:r>
+              <a:rPr lang="is-IS" dirty="0" smtClean="0"/>
+              <a:t>Intel mkl-dnn 0.7: </a:t>
+            </a:r>
+            <a:r>
+              <a:rPr lang="en-US" dirty="0" smtClean="0"/>
+              <a:t>Intel MKL-DNN is intended for accelerating deep learning frameworks on IA. It includes highly </a:t>
+            </a:r>
+            <a:r>
+              <a:rPr lang="en-US" dirty="0" err="1" smtClean="0"/>
+              <a:t>vectorized</a:t>
+            </a:r>
+            <a:r>
+              <a:rPr lang="en-US" dirty="0" smtClean="0"/>
+              <a:t> and threaded building blocks for implementing convolutional neural networks with C and C++ interfaces;</a:t>
+            </a:r>
           </a:p>
           <a:p>
             <a:r>
@@ -4243,20 +5075,25 @@
             </a:r>
             <a:r>
               <a:rPr lang="en-US" dirty="0" smtClean="0"/>
-              <a:t> 1.12.1:</a:t>
-            </a:r>
-          </a:p>
-          <a:p>
-            <a:r>
-              <a:rPr lang="en-US" dirty="0" smtClean="0"/>
-              <a:t>Intel 8-core Xeon E5: 16 CPU(s), 3GHz, 32GB memory; </a:t>
-            </a:r>
-          </a:p>
-          <a:p>
-            <a:r>
-              <a:rPr lang="en-US" dirty="0" smtClean="0"/>
-              <a:t>Run command: </a:t>
-            </a:r>
+              <a:t> 1.13.1;</a:t>
+            </a:r>
+          </a:p>
+          <a:p>
+            <a:r>
+              <a:rPr lang="en-US" dirty="0" smtClean="0"/>
+              <a:t>Intel Xeon E5-2680 v4: 56 CPU(s), 3GHz, 263GB memory; </a:t>
+            </a:r>
+          </a:p>
+          <a:p>
+            <a:r>
+              <a:rPr lang="en-US" dirty="0" smtClean="0"/>
+              <a:t>Run </a:t>
+            </a:r>
+            <a:r>
+              <a:rPr lang="en-US" dirty="0" smtClean="0"/>
+              <a:t>command line: </a:t>
+            </a:r>
+            <a:endParaRPr lang="en-US" dirty="0" smtClean="0"/>
           </a:p>
           <a:p>
             <a:pPr marL="457200" lvl="1" indent="0">
@@ -4264,7 +5101,7 @@
             </a:pPr>
             <a:r>
               <a:rPr lang="en-US" sz="1500" dirty="0" smtClean="0"/>
-              <a:t>~/miniconda3/bin/python3.6 ~/Projects/3DSegTensorFlow/</a:t>
+              <a:t>~/intel/intelpython3/bin/python3 ~/Projects/3DSegTensorFlow/</a:t>
             </a:r>
             <a:r>
               <a:rPr lang="en-US" sz="1500" dirty="0" err="1" smtClean="0"/>
@@ -4272,8 +5109,18 @@
             </a:r>
             <a:r>
               <a:rPr lang="en-US" sz="1500" dirty="0" smtClean="0"/>
-              <a:t> ~/temp/T1T2LabelCubicNormalize.csv 20 240,200,160,120,80,40,26 0.002</a:t>
-            </a:r>
+              <a:t> ~/temp/T1T2LabelCubicNormalize.csv </a:t>
+            </a:r>
+            <a:r>
+              <a:rPr lang="en-US" sz="1500" dirty="0"/>
+              <a:t>20 </a:t>
+            </a:r>
+            <a:r>
+              <a:rPr lang="en-US" sz="1500" dirty="0" smtClean="0"/>
+              <a:t>240,200,160,120,80,40,26 0.002</a:t>
+            </a:r>
+          </a:p>
+          <a:p>
             <a:endParaRPr lang="en-US" dirty="0" smtClean="0"/>
           </a:p>
           <a:p>
@@ -4307,7 +5154,7 @@
     </p:spTree>
     <p:extLst>
       <p:ext uri="{BB962C8B-B14F-4D97-AF65-F5344CB8AC3E}">
-        <p14:creationId xmlns:p14="http://schemas.microsoft.com/office/powerpoint/2010/main" val="318886150"/>
+        <p14:creationId xmlns:p14="http://schemas.microsoft.com/office/powerpoint/2010/main" val="2017103905"/>
       </p:ext>
     </p:extLst>
   </p:cSld>
@@ -4358,7 +5205,7 @@
           <a:p>
             <a:r>
               <a:rPr lang="en-US" sz="2800" dirty="0" smtClean="0"/>
-              <a:t>Test Environment in Local Server Putamen with Manually  Compiled Tensorflow</a:t>
+              <a:t>Test Environment in Local Server Putamen with Intel Compiled Tensorflow</a:t>
             </a:r>
             <a:endParaRPr lang="en-US" sz="2800" dirty="0"/>
           </a:p>
@@ -4382,7 +5229,7 @@
         </p:spPr>
         <p:txBody>
           <a:bodyPr>
-            <a:normAutofit/>
+            <a:normAutofit fontScale="92500" lnSpcReduction="20000"/>
           </a:bodyPr>
           <a:lstStyle/>
           <a:p>
@@ -4399,19 +5246,14 @@
           <a:p>
             <a:r>
               <a:rPr lang="en-US" dirty="0" smtClean="0"/>
-              <a:t>Standard Python 3.6.2;</a:t>
-            </a:r>
-          </a:p>
-          <a:p>
-            <a:r>
-              <a:rPr lang="en-US" dirty="0" smtClean="0"/>
-              <a:t>Manually compiled Tensorflow master branch in </a:t>
-            </a:r>
-            <a:r>
-              <a:rPr lang="en-US" dirty="0" err="1" smtClean="0"/>
-              <a:t>Github</a:t>
-            </a:r>
-            <a:endParaRPr lang="en-US" dirty="0" smtClean="0"/>
+              <a:t>Intel Python 3.6.2;</a:t>
+            </a:r>
+          </a:p>
+          <a:p>
+            <a:r>
+              <a:rPr lang="en-US" dirty="0" smtClean="0"/>
+              <a:t>Intel compiled Tensorflow 1.1.1</a:t>
+            </a:r>
           </a:p>
           <a:p>
             <a:pPr marL="457200" lvl="1" indent="0">
@@ -4420,20 +5262,18 @@
             <a:r>
               <a:rPr lang="en-US" dirty="0" smtClean="0"/>
               <a:t>URL:  </a:t>
+            </a:r>
+            <a:r>
+              <a:rPr lang="en-US" dirty="0">
+                <a:hlinkClick r:id="rId2"/>
+              </a:rPr>
+              <a:t>https://</a:t>
             </a:r>
             <a:r>
               <a:rPr lang="en-US" dirty="0" smtClean="0">
                 <a:hlinkClick r:id="rId2"/>
               </a:rPr>
-              <a:t>https://github.com/tensorflow/tensorflow</a:t>
-            </a:r>
-            <a:r>
-              <a:rPr lang="en-US" dirty="0" smtClean="0"/>
-              <a:t> (</a:t>
-            </a:r>
-            <a:r>
-              <a:rPr lang="en-US" smtClean="0"/>
-              <a:t>August 3th,2017 version)</a:t>
+              <a:t>repo.continuum.io/pkgs/free/osx-64/tensorflow-1.1.0-np112py36_0.tar.bz2</a:t>
             </a:r>
             <a:endParaRPr lang="en-US" dirty="0" smtClean="0"/>
           </a:p>
@@ -4442,55 +5282,36 @@
               <a:buNone/>
             </a:pPr>
             <a:r>
+              <a:rPr lang="en-US" dirty="0" smtClean="0"/>
+              <a:t>This </a:t>
+            </a:r>
+            <a:r>
+              <a:rPr lang="en-US" dirty="0" err="1"/>
+              <a:t>C</a:t>
+            </a:r>
+            <a:r>
               <a:rPr lang="en-US" dirty="0" err="1" smtClean="0"/>
-              <a:t>Bazel</a:t>
-            </a:r>
-            <a:r>
-              <a:rPr lang="en-US" dirty="0" smtClean="0"/>
-              <a:t> compile:</a:t>
-            </a:r>
-          </a:p>
-          <a:p>
-            <a:pPr marL="1371600" lvl="3" indent="0">
-              <a:buNone/>
-            </a:pPr>
-            <a:r>
-              <a:rPr lang="en-US" sz="1600" dirty="0" err="1" smtClean="0"/>
-              <a:t>bazel</a:t>
-            </a:r>
-            <a:r>
-              <a:rPr lang="en-US" sz="1600" dirty="0" smtClean="0"/>
-              <a:t> build --</a:t>
-            </a:r>
-            <a:r>
-              <a:rPr lang="en-US" sz="1600" dirty="0" err="1" smtClean="0"/>
-              <a:t>config</a:t>
-            </a:r>
-            <a:r>
-              <a:rPr lang="en-US" sz="1600" dirty="0" smtClean="0"/>
-              <a:t>=opt //</a:t>
-            </a:r>
-            <a:r>
-              <a:rPr lang="en-US" sz="1600" dirty="0" err="1" smtClean="0"/>
-              <a:t>tensorflow</a:t>
-            </a:r>
-            <a:r>
-              <a:rPr lang="en-US" sz="1600" dirty="0" smtClean="0"/>
-              <a:t>/tools/</a:t>
-            </a:r>
-            <a:r>
-              <a:rPr lang="en-US" sz="1600" dirty="0" err="1" smtClean="0"/>
-              <a:t>pip_package:build_pip_package</a:t>
-            </a:r>
-            <a:endParaRPr lang="en-US" sz="1600" dirty="0" smtClean="0"/>
-          </a:p>
-          <a:p>
-            <a:pPr marL="457200" lvl="1" indent="0">
-              <a:buNone/>
-            </a:pPr>
-            <a:r>
-              <a:rPr lang="en-US" dirty="0" smtClean="0"/>
-              <a:t>This manually compiled Tensorflow library </a:t>
+              <a:t>onda</a:t>
+            </a:r>
+            <a:r>
+              <a:rPr lang="en-US" dirty="0" smtClean="0"/>
+              <a:t> Tensorflow library </a:t>
+            </a:r>
+            <a:r>
+              <a:rPr lang="en-US" sz="2800" b="1" dirty="0" err="1" smtClean="0">
+                <a:solidFill>
+                  <a:schemeClr val="accent1"/>
+                </a:solidFill>
+              </a:rPr>
+              <a:t>wasn</a:t>
+            </a:r>
+            <a:r>
+              <a:rPr lang="mr-IN" sz="2800" b="1" dirty="0" smtClean="0">
+                <a:solidFill>
+                  <a:schemeClr val="accent1"/>
+                </a:solidFill>
+              </a:rPr>
+              <a:t>’</a:t>
             </a:r>
             <a:r>
               <a:rPr lang="en-US" sz="2800" b="1" dirty="0" smtClean="0">
@@ -4498,9 +5319,65 @@
                   <a:schemeClr val="accent1"/>
                 </a:solidFill>
               </a:rPr>
-              <a:t>uses SSE, AVX, FMA instruction set, without using Intel MKL.</a:t>
-            </a:r>
-            <a:endParaRPr lang="en-US" dirty="0" smtClean="0"/>
+              <a:t>t</a:t>
+            </a:r>
+            <a:r>
+              <a:rPr lang="en-US" dirty="0" smtClean="0"/>
+              <a:t> compiled to use below instructions:</a:t>
+            </a:r>
+          </a:p>
+          <a:p>
+            <a:pPr marL="457200" lvl="1" indent="0">
+              <a:buNone/>
+            </a:pPr>
+            <a:r>
+              <a:rPr lang="en-US" dirty="0" smtClean="0">
+                <a:solidFill>
+                  <a:schemeClr val="accent1"/>
+                </a:solidFill>
+              </a:rPr>
+              <a:t>SSE4.1 and SSE4.2</a:t>
+            </a:r>
+            <a:r>
+              <a:rPr lang="en-US" dirty="0" smtClean="0"/>
+              <a:t>: Streaming SIMD Extensions 4 is a SIMD CPU instruction set used in the Intel Core microarchitecture and AMD K10 (K8L);</a:t>
+            </a:r>
+          </a:p>
+          <a:p>
+            <a:pPr marL="457200" lvl="1" indent="0">
+              <a:buNone/>
+            </a:pPr>
+            <a:r>
+              <a:rPr lang="en-US" dirty="0" smtClean="0">
+                <a:solidFill>
+                  <a:schemeClr val="accent1"/>
+                </a:solidFill>
+              </a:rPr>
+              <a:t>AVX and AVX2</a:t>
+            </a:r>
+            <a:r>
+              <a:rPr lang="en-US" dirty="0" smtClean="0"/>
+              <a:t>:  Advanced Vector Extensions are extensions to the x86 instruction set architecture for microprocessors from Intel and AMD</a:t>
+            </a:r>
+          </a:p>
+          <a:p>
+            <a:r>
+              <a:rPr lang="is-IS" dirty="0" smtClean="0"/>
+              <a:t>Intel mkl 2017.0.3: </a:t>
+            </a:r>
+            <a:r>
+              <a:rPr lang="en-US" dirty="0" smtClean="0"/>
+              <a:t>Intel Math Kernel Library (Intel MKL) is a library of optimized math routines</a:t>
+            </a:r>
+            <a:r>
+              <a:rPr lang="is-IS" dirty="0" smtClean="0"/>
+              <a:t>;</a:t>
+            </a:r>
+            <a:r>
+              <a:rPr lang="is-IS" dirty="0"/>
+              <a:t>  </a:t>
+            </a:r>
+            <a:endParaRPr lang="is-IS" dirty="0" smtClean="0"/>
           </a:p>
           <a:p>
             <a:r>
@@ -4513,7 +5390,7 @@
             </a:r>
             <a:r>
               <a:rPr lang="en-US" dirty="0" smtClean="0"/>
-              <a:t> 1.8.0.rc1;</a:t>
+              <a:t> 1.12.1:</a:t>
             </a:r>
           </a:p>
           <a:p>
@@ -4534,7 +5411,7 @@
             </a:pPr>
             <a:r>
               <a:rPr lang="en-US" sz="1500" dirty="0" smtClean="0"/>
-              <a:t>python3 ~/Projects/3DSegTensorFlow/</a:t>
+              <a:t>~/miniconda3/bin/python3.6 ~/Projects/3DSegTensorFlow/</a:t>
             </a:r>
             <a:r>
               <a:rPr lang="en-US" sz="1500" dirty="0" err="1" smtClean="0"/>
@@ -4544,6 +5421,9 @@
               <a:rPr lang="en-US" sz="1500" dirty="0" smtClean="0"/>
               <a:t> ~/temp/T1T2LabelCubicNormalize.csv 20 240,200,160,120,80,40,26 0.002</a:t>
             </a:r>
+            <a:endParaRPr lang="en-US" dirty="0" smtClean="0"/>
+          </a:p>
+          <a:p>
             <a:endParaRPr lang="en-US" dirty="0"/>
           </a:p>
         </p:txBody>
@@ -4574,7 +5454,7 @@
     </p:spTree>
     <p:extLst>
       <p:ext uri="{BB962C8B-B14F-4D97-AF65-F5344CB8AC3E}">
-        <p14:creationId xmlns:p14="http://schemas.microsoft.com/office/powerpoint/2010/main" val="1701430652"/>
+        <p14:creationId xmlns:p14="http://schemas.microsoft.com/office/powerpoint/2010/main" val="318886150"/>
       </p:ext>
     </p:extLst>
   </p:cSld>
@@ -4613,6 +5493,268 @@
         </p:nvSpPr>
         <p:spPr>
           <a:xfrm>
+            <a:off x="0" y="131975"/>
+            <a:ext cx="12094590" cy="424206"/>
+          </a:xfrm>
+        </p:spPr>
+        <p:txBody>
+          <a:bodyPr>
+            <a:noAutofit/>
+          </a:bodyPr>
+          <a:lstStyle/>
+          <a:p>
+            <a:r>
+              <a:rPr lang="en-US" sz="2800" dirty="0" smtClean="0"/>
+              <a:t>Test Environment in Local Server Putamen with Manually  Compiled Tensorflow</a:t>
+            </a:r>
+            <a:endParaRPr lang="en-US" sz="2800" dirty="0"/>
+          </a:p>
+        </p:txBody>
+      </p:sp>
+      <p:sp>
+        <p:nvSpPr>
+          <p:cNvPr id="3" name="Content Placeholder 2"/>
+          <p:cNvSpPr>
+            <a:spLocks noGrp="1"/>
+          </p:cNvSpPr>
+          <p:nvPr>
+            <p:ph idx="1"/>
+          </p:nvPr>
+        </p:nvSpPr>
+        <p:spPr>
+          <a:xfrm>
+            <a:off x="311085" y="1027522"/>
+            <a:ext cx="11208470" cy="5410985"/>
+          </a:xfrm>
+        </p:spPr>
+        <p:txBody>
+          <a:bodyPr>
+            <a:normAutofit/>
+          </a:bodyPr>
+          <a:lstStyle/>
+          <a:p>
+            <a:r>
+              <a:rPr lang="en-US" dirty="0" err="1" smtClean="0"/>
+              <a:t>maxOS</a:t>
+            </a:r>
+            <a:r>
+              <a:rPr lang="en-US" dirty="0" smtClean="0"/>
+              <a:t> Sierra 10.12.6</a:t>
+            </a:r>
+            <a:endParaRPr lang="en-US" dirty="0"/>
+          </a:p>
+          <a:p>
+            <a:r>
+              <a:rPr lang="en-US" dirty="0" smtClean="0"/>
+              <a:t>Standard Python 3.6.2;</a:t>
+            </a:r>
+          </a:p>
+          <a:p>
+            <a:r>
+              <a:rPr lang="en-US" dirty="0" smtClean="0"/>
+              <a:t>Manually compiled Tensorflow master branch in </a:t>
+            </a:r>
+            <a:r>
+              <a:rPr lang="en-US" dirty="0" err="1" smtClean="0"/>
+              <a:t>Github</a:t>
+            </a:r>
+            <a:endParaRPr lang="en-US" dirty="0" smtClean="0"/>
+          </a:p>
+          <a:p>
+            <a:pPr marL="457200" lvl="1" indent="0">
+              <a:buNone/>
+            </a:pPr>
+            <a:r>
+              <a:rPr lang="en-US" dirty="0" smtClean="0"/>
+              <a:t>URL:  </a:t>
+            </a:r>
+            <a:r>
+              <a:rPr lang="en-US" dirty="0" smtClean="0">
+                <a:hlinkClick r:id="rId2"/>
+              </a:rPr>
+              <a:t>https://github.com/tensorflow/tensorflow</a:t>
+            </a:r>
+            <a:r>
+              <a:rPr lang="en-US" dirty="0" smtClean="0"/>
+              <a:t> (August 3th,2017 version)</a:t>
+            </a:r>
+          </a:p>
+          <a:p>
+            <a:pPr marL="457200" lvl="1" indent="0">
+              <a:buNone/>
+            </a:pPr>
+            <a:r>
+              <a:rPr lang="en-US" dirty="0" err="1" smtClean="0"/>
+              <a:t>Bazel</a:t>
+            </a:r>
+            <a:r>
+              <a:rPr lang="en-US" dirty="0" smtClean="0"/>
+              <a:t> compile:</a:t>
+            </a:r>
+          </a:p>
+          <a:p>
+            <a:pPr marL="1371600" lvl="3" indent="0">
+              <a:buNone/>
+            </a:pPr>
+            <a:r>
+              <a:rPr lang="en-US" sz="1600" dirty="0" err="1" smtClean="0"/>
+              <a:t>bazel</a:t>
+            </a:r>
+            <a:r>
+              <a:rPr lang="en-US" sz="1600" dirty="0" smtClean="0"/>
+              <a:t> build --</a:t>
+            </a:r>
+            <a:r>
+              <a:rPr lang="en-US" sz="1600" dirty="0" err="1" smtClean="0"/>
+              <a:t>config</a:t>
+            </a:r>
+            <a:r>
+              <a:rPr lang="en-US" sz="1600" dirty="0" smtClean="0"/>
+              <a:t>=opt //</a:t>
+            </a:r>
+            <a:r>
+              <a:rPr lang="en-US" sz="1600" dirty="0" err="1" smtClean="0"/>
+              <a:t>tensorflow</a:t>
+            </a:r>
+            <a:r>
+              <a:rPr lang="en-US" sz="1600" dirty="0" smtClean="0"/>
+              <a:t>/tools/</a:t>
+            </a:r>
+            <a:r>
+              <a:rPr lang="en-US" sz="1600" dirty="0" err="1" smtClean="0"/>
+              <a:t>pip_package:build_pip_package</a:t>
+            </a:r>
+            <a:endParaRPr lang="en-US" sz="1600" dirty="0" smtClean="0"/>
+          </a:p>
+          <a:p>
+            <a:pPr marL="457200" lvl="1" indent="0">
+              <a:buNone/>
+            </a:pPr>
+            <a:r>
+              <a:rPr lang="en-US" dirty="0" smtClean="0"/>
+              <a:t>This manually compiled Tensorflow library </a:t>
+            </a:r>
+            <a:r>
+              <a:rPr lang="en-US" sz="2800" b="1" dirty="0" smtClean="0">
+                <a:solidFill>
+                  <a:schemeClr val="accent1"/>
+                </a:solidFill>
+              </a:rPr>
+              <a:t>uses SSE, AVX, FMA instruction set, without using Intel MKL.</a:t>
+            </a:r>
+            <a:endParaRPr lang="en-US" dirty="0" smtClean="0"/>
+          </a:p>
+          <a:p>
+            <a:r>
+              <a:rPr lang="en-US" dirty="0" smtClean="0"/>
+              <a:t>Intel </a:t>
+            </a:r>
+            <a:r>
+              <a:rPr lang="en-US" dirty="0" err="1" smtClean="0"/>
+              <a:t>Numpy</a:t>
+            </a:r>
+            <a:r>
+              <a:rPr lang="en-US" dirty="0" smtClean="0"/>
+              <a:t> 1.8.0.rc1;</a:t>
+            </a:r>
+          </a:p>
+          <a:p>
+            <a:r>
+              <a:rPr lang="en-US" dirty="0" smtClean="0"/>
+              <a:t>Intel 8-core Xeon E5: 16 CPU(s), 3GHz, 32GB memory; </a:t>
+            </a:r>
+          </a:p>
+          <a:p>
+            <a:r>
+              <a:rPr lang="en-US" dirty="0" smtClean="0"/>
+              <a:t>Run command: </a:t>
+            </a:r>
+          </a:p>
+          <a:p>
+            <a:pPr marL="457200" lvl="1" indent="0">
+              <a:buNone/>
+            </a:pPr>
+            <a:r>
+              <a:rPr lang="en-US" sz="1500" dirty="0" smtClean="0"/>
+              <a:t>python3 ~/Projects/3DSegTensorFlow/</a:t>
+            </a:r>
+            <a:r>
+              <a:rPr lang="en-US" sz="1500" dirty="0" err="1" smtClean="0"/>
+              <a:t>MultiCoreTest.py</a:t>
+            </a:r>
+            <a:r>
+              <a:rPr lang="en-US" sz="1500" dirty="0" smtClean="0"/>
+              <a:t> ~/temp/T1T2LabelCubicNormalize.csv 20 240,200,160,120,80,40,26 0.002</a:t>
+            </a:r>
+            <a:endParaRPr lang="en-US" dirty="0"/>
+          </a:p>
+        </p:txBody>
+      </p:sp>
+      <p:sp>
+        <p:nvSpPr>
+          <p:cNvPr id="4" name="Slide Number Placeholder 3"/>
+          <p:cNvSpPr>
+            <a:spLocks noGrp="1"/>
+          </p:cNvSpPr>
+          <p:nvPr>
+            <p:ph type="sldNum" sz="quarter" idx="12"/>
+          </p:nvPr>
+        </p:nvSpPr>
+        <p:spPr/>
+        <p:txBody>
+          <a:bodyPr/>
+          <a:lstStyle/>
+          <a:p>
+            <a:fld id="{C9BA8385-F9D7-7B47-B30A-D7457BD10BB9}" type="slidenum">
+              <a:rPr lang="en-US" smtClean="0"/>
+              <a:t>6</a:t>
+            </a:fld>
+            <a:endParaRPr lang="en-US"/>
+          </a:p>
+        </p:txBody>
+      </p:sp>
+    </p:spTree>
+    <p:extLst>
+      <p:ext uri="{BB962C8B-B14F-4D97-AF65-F5344CB8AC3E}">
+        <p14:creationId xmlns:p14="http://schemas.microsoft.com/office/powerpoint/2010/main" val="1701430652"/>
+      </p:ext>
+    </p:extLst>
+  </p:cSld>
+  <p:clrMapOvr>
+    <a:masterClrMapping/>
+  </p:clrMapOvr>
+</p:sld>
+</file>
+
+<file path=ppt/slides/slide7.xml><?xml version="1.0" encoding="utf-8"?>
+<p:sld xmlns:a="http://schemas.openxmlformats.org/drawingml/2006/main" xmlns:r="http://schemas.openxmlformats.org/officeDocument/2006/relationships" xmlns:p="http://schemas.openxmlformats.org/presentationml/2006/main">
+  <p:cSld>
+    <p:spTree>
+      <p:nvGrpSpPr>
+        <p:cNvPr id="1" name=""/>
+        <p:cNvGrpSpPr/>
+        <p:nvPr/>
+      </p:nvGrpSpPr>
+      <p:grpSpPr>
+        <a:xfrm>
+          <a:off x="0" y="0"/>
+          <a:ext cx="0" cy="0"/>
+          <a:chOff x="0" y="0"/>
+          <a:chExt cx="0" cy="0"/>
+        </a:xfrm>
+      </p:grpSpPr>
+      <p:sp>
+        <p:nvSpPr>
+          <p:cNvPr id="2" name="Title 1"/>
+          <p:cNvSpPr>
+            <a:spLocks noGrp="1"/>
+          </p:cNvSpPr>
+          <p:nvPr>
+            <p:ph type="title"/>
+          </p:nvPr>
+        </p:nvSpPr>
+        <p:spPr>
+          <a:xfrm>
             <a:off x="0" y="1"/>
             <a:ext cx="12192000" cy="678730"/>
           </a:xfrm>
@@ -4625,11 +5767,7 @@
           <a:p>
             <a:r>
               <a:rPr lang="en-US" dirty="0" smtClean="0"/>
-              <a:t>Experimental </a:t>
-            </a:r>
-            <a:r>
-              <a:rPr lang="en-US" dirty="0" smtClean="0"/>
-              <a:t>Result in Sep 21, 2017</a:t>
+              <a:t>Experimental Result in Sep 21, 2017</a:t>
             </a:r>
             <a:endParaRPr lang="en-US" dirty="0"/>
           </a:p>
@@ -4652,7 +5790,7 @@
           <a:p>
             <a:fld id="{C9BA8385-F9D7-7B47-B30A-D7457BD10BB9}" type="slidenum">
               <a:rPr lang="en-US" smtClean="0"/>
-              <a:t>6</a:t>
+              <a:t>7</a:t>
             </a:fld>
             <a:endParaRPr lang="en-US"/>
           </a:p>
@@ -6133,7 +7271,7 @@
 </p:sld>
 </file>
 
-<file path=ppt/slides/slide7.xml><?xml version="1.0" encoding="utf-8"?>
+<file path=ppt/slides/slide8.xml><?xml version="1.0" encoding="utf-8"?>
 <p:sld xmlns:a="http://schemas.openxmlformats.org/drawingml/2006/main" xmlns:r="http://schemas.openxmlformats.org/officeDocument/2006/relationships" xmlns:p="http://schemas.openxmlformats.org/presentationml/2006/main">
   <p:cSld>
     <p:spTree>
@@ -6167,7 +7305,7 @@
           <a:p>
             <a:fld id="{C9BA8385-F9D7-7B47-B30A-D7457BD10BB9}" type="slidenum">
               <a:rPr lang="en-US" smtClean="0"/>
-              <a:t>7</a:t>
+              <a:t>8</a:t>
             </a:fld>
             <a:endParaRPr lang="en-US"/>
           </a:p>
@@ -6197,11 +7335,7 @@
           <a:p>
             <a:r>
               <a:rPr lang="en-US" dirty="0" smtClean="0"/>
-              <a:t>Experimental </a:t>
-            </a:r>
-            <a:r>
-              <a:rPr lang="en-US" dirty="0" smtClean="0"/>
-              <a:t>Result in Sep 30, 2017</a:t>
+              <a:t>Experimental Result in Sep 30, 2017</a:t>
             </a:r>
             <a:endParaRPr lang="en-US" dirty="0"/>
           </a:p>
@@ -6274,15 +7408,7 @@
             </a:r>
             <a:r>
               <a:rPr lang="en-US" sz="1200" dirty="0"/>
-              <a:t> ~/temp/T1T2LabelCubicNormalize.csv </a:t>
-            </a:r>
-            <a:r>
-              <a:rPr lang="en-US" sz="1200" dirty="0"/>
-              <a:t>20 </a:t>
-            </a:r>
-            <a:r>
-              <a:rPr lang="en-US" sz="1200" dirty="0"/>
-              <a:t>240,200,160,120,80,40,26 </a:t>
+              <a:t> ~/temp/T1T2LabelCubicNormalize.csv 20 240,200,160,120,80,40,26 </a:t>
             </a:r>
             <a:r>
               <a:rPr lang="en-US" sz="1200" dirty="0" smtClean="0"/>
@@ -6326,7 +7452,7 @@
 </p:sld>
 </file>
 
-<file path=ppt/slides/slide8.xml><?xml version="1.0" encoding="utf-8"?>
+<file path=ppt/slides/slide9.xml><?xml version="1.0" encoding="utf-8"?>
 <p:sld xmlns:a="http://schemas.openxmlformats.org/drawingml/2006/main" xmlns:r="http://schemas.openxmlformats.org/officeDocument/2006/relationships" xmlns:p="http://schemas.openxmlformats.org/presentationml/2006/main">
   <p:cSld>
     <p:spTree>
@@ -6355,49 +7481,207 @@
         </p:nvSpPr>
         <p:spPr>
           <a:xfrm>
-            <a:off x="4844593" y="2514438"/>
-            <a:ext cx="2828826" cy="756664"/>
+            <a:off x="0" y="0"/>
+            <a:ext cx="10515600" cy="676195"/>
           </a:xfrm>
         </p:spPr>
         <p:txBody>
+          <a:bodyPr>
+            <a:normAutofit fontScale="90000"/>
+          </a:bodyPr>
+          <a:lstStyle/>
+          <a:p>
+            <a:r>
+              <a:rPr lang="en-US" dirty="0" smtClean="0"/>
+              <a:t>Test in Putamen with local compiled Tensorflow</a:t>
+            </a:r>
+            <a:endParaRPr lang="en-US" dirty="0"/>
+          </a:p>
+        </p:txBody>
+      </p:sp>
+      <p:sp>
+        <p:nvSpPr>
+          <p:cNvPr id="4" name="Slide Number Placeholder 3"/>
+          <p:cNvSpPr>
+            <a:spLocks noGrp="1"/>
+          </p:cNvSpPr>
+          <p:nvPr>
+            <p:ph type="sldNum" sz="quarter" idx="12"/>
+          </p:nvPr>
+        </p:nvSpPr>
+        <p:spPr/>
+        <p:txBody>
           <a:bodyPr/>
           <a:lstStyle/>
           <a:p>
-            <a:r>
-              <a:rPr lang="en-US" smtClean="0"/>
-              <a:t>Thank you</a:t>
-            </a:r>
-            <a:endParaRPr lang="en-US" dirty="0"/>
-          </a:p>
-        </p:txBody>
-      </p:sp>
-      <p:sp>
-        <p:nvSpPr>
-          <p:cNvPr id="4" name="Slide Number Placeholder 3"/>
-          <p:cNvSpPr>
-            <a:spLocks noGrp="1"/>
-          </p:cNvSpPr>
-          <p:nvPr>
-            <p:ph type="sldNum" sz="quarter" idx="12"/>
-          </p:nvPr>
-        </p:nvSpPr>
-        <p:spPr/>
-        <p:txBody>
-          <a:bodyPr/>
-          <a:lstStyle/>
-          <a:p>
             <a:fld id="{C9BA8385-F9D7-7B47-B30A-D7457BD10BB9}" type="slidenum">
               <a:rPr lang="en-US" smtClean="0"/>
-              <a:t>8</a:t>
+              <a:t>9</a:t>
             </a:fld>
             <a:endParaRPr lang="en-US"/>
+          </a:p>
+        </p:txBody>
+      </p:sp>
+      <p:pic>
+        <p:nvPicPr>
+          <p:cNvPr id="5" name="Picture 4"/>
+          <p:cNvPicPr>
+            <a:picLocks noChangeAspect="1"/>
+          </p:cNvPicPr>
+          <p:nvPr/>
+        </p:nvPicPr>
+        <p:blipFill>
+          <a:blip r:embed="rId2"/>
+          <a:stretch>
+            <a:fillRect/>
+          </a:stretch>
+        </p:blipFill>
+        <p:spPr>
+          <a:xfrm>
+            <a:off x="291192" y="824594"/>
+            <a:ext cx="3771900" cy="2857500"/>
+          </a:xfrm>
+          <a:prstGeom prst="rect">
+            <a:avLst/>
+          </a:prstGeom>
+        </p:spPr>
+      </p:pic>
+      <p:sp>
+        <p:nvSpPr>
+          <p:cNvPr id="6" name="Rectangle 5"/>
+          <p:cNvSpPr/>
+          <p:nvPr/>
+        </p:nvSpPr>
+        <p:spPr>
+          <a:xfrm>
+            <a:off x="128067" y="3774158"/>
+            <a:ext cx="5366017" cy="1477328"/>
+          </a:xfrm>
+          <a:prstGeom prst="rect">
+            <a:avLst/>
+          </a:prstGeom>
+        </p:spPr>
+        <p:txBody>
+          <a:bodyPr wrap="square">
+            <a:spAutoFit/>
+          </a:bodyPr>
+          <a:lstStyle/>
+          <a:p>
+            <a:r>
+              <a:rPr lang="en-US" dirty="0"/>
+              <a:t>python3 ~/Projects/3DSegTensorFlow/</a:t>
+            </a:r>
+            <a:r>
+              <a:rPr lang="en-US" dirty="0" err="1"/>
+              <a:t>MultiCoreTest.py</a:t>
+            </a:r>
+            <a:r>
+              <a:rPr lang="en-US" dirty="0"/>
+              <a:t> ~/temp/T1T2LabelCubicNormalize.csv </a:t>
+            </a:r>
+            <a:r>
+              <a:rPr lang="en-US" b="1" dirty="0">
+                <a:solidFill>
+                  <a:srgbClr val="FF0000"/>
+                </a:solidFill>
+              </a:rPr>
+              <a:t>10</a:t>
+            </a:r>
+            <a:r>
+              <a:rPr lang="en-US" dirty="0"/>
+              <a:t> 240,200,160,120,80,40,26 </a:t>
+            </a:r>
+            <a:r>
+              <a:rPr lang="en-US" dirty="0" smtClean="0"/>
+              <a:t>0.002</a:t>
+            </a:r>
+          </a:p>
+          <a:p>
+            <a:endParaRPr lang="en-US" dirty="0"/>
+          </a:p>
+          <a:p>
+            <a:r>
+              <a:rPr lang="en-US" dirty="0" smtClean="0"/>
+              <a:t>Test date: Oct 3th,2017</a:t>
+            </a:r>
+            <a:endParaRPr lang="en-US" dirty="0"/>
+          </a:p>
+        </p:txBody>
+      </p:sp>
+      <p:sp>
+        <p:nvSpPr>
+          <p:cNvPr id="7" name="Rectangle 6"/>
+          <p:cNvSpPr/>
+          <p:nvPr/>
+        </p:nvSpPr>
+        <p:spPr>
+          <a:xfrm>
+            <a:off x="6021721" y="3743421"/>
+            <a:ext cx="6034528" cy="1477328"/>
+          </a:xfrm>
+          <a:prstGeom prst="rect">
+            <a:avLst/>
+          </a:prstGeom>
+        </p:spPr>
+        <p:txBody>
+          <a:bodyPr wrap="square">
+            <a:spAutoFit/>
+          </a:bodyPr>
+          <a:lstStyle/>
+          <a:p>
+            <a:r>
+              <a:rPr lang="en-US" dirty="0"/>
+              <a:t>python3 ~/Projects/3DSegTensorFlow/</a:t>
+            </a:r>
+            <a:r>
+              <a:rPr lang="en-US" dirty="0" err="1"/>
+              <a:t>MultiCoreTest.py</a:t>
+            </a:r>
+            <a:r>
+              <a:rPr lang="en-US" dirty="0"/>
+              <a:t> ~/temp/T1T2LabelCubicNormalize.csv </a:t>
+            </a:r>
+            <a:r>
+              <a:rPr lang="en-US" dirty="0">
+                <a:solidFill>
+                  <a:srgbClr val="0000FF"/>
+                </a:solidFill>
+              </a:rPr>
+              <a:t>20 </a:t>
+            </a:r>
+            <a:r>
+              <a:rPr lang="en-US" dirty="0"/>
+              <a:t>240,200,160,120,80,40,26 </a:t>
+            </a:r>
+            <a:r>
+              <a:rPr lang="en-US" dirty="0" smtClean="0"/>
+              <a:t>0.002</a:t>
+            </a:r>
+          </a:p>
+          <a:p>
+            <a:endParaRPr lang="en-US" dirty="0"/>
+          </a:p>
+          <a:p>
+            <a:r>
+              <a:rPr lang="en-US" dirty="0" smtClean="0"/>
+              <a:t>Test date: Oct 4</a:t>
+            </a:r>
+            <a:r>
+              <a:rPr lang="en-US" baseline="30000" dirty="0" smtClean="0"/>
+              <a:t>th</a:t>
+            </a:r>
+            <a:r>
+              <a:rPr lang="en-US" dirty="0" smtClean="0"/>
+              <a:t>, 2017</a:t>
+            </a:r>
+            <a:endParaRPr lang="en-US" dirty="0"/>
           </a:p>
         </p:txBody>
       </p:sp>
     </p:spTree>
     <p:extLst>
       <p:ext uri="{BB962C8B-B14F-4D97-AF65-F5344CB8AC3E}">
-        <p14:creationId xmlns:p14="http://schemas.microsoft.com/office/powerpoint/2010/main" val="143562469"/>
+        <p14:creationId xmlns:p14="http://schemas.microsoft.com/office/powerpoint/2010/main" val="1491264908"/>
       </p:ext>
     </p:extLst>
   </p:cSld>

</xml_diff>

<commit_message>
add putamen test data of 20 epochs
</commit_message>
<xml_diff>
--- a/TensorflowScalabilityTest.pptx
+++ b/TensorflowScalabilityTest.pptx
@@ -3435,11 +3435,7 @@
           <a:p>
             <a:r>
               <a:rPr lang="en-US" dirty="0" smtClean="0"/>
-              <a:t>TensorFlow Scalability </a:t>
-            </a:r>
-            <a:r>
-              <a:rPr lang="en-US" dirty="0" smtClean="0"/>
-              <a:t>Research</a:t>
+              <a:t>TensorFlow Scalability Research</a:t>
             </a:r>
             <a:endParaRPr lang="en-US" dirty="0"/>
           </a:p>
@@ -4314,11 +4310,7 @@
           <a:p>
             <a:r>
               <a:rPr lang="en-US" dirty="0" smtClean="0"/>
-              <a:t>Input layer: 54 nodes with normalized MRI Brain gray pixel </a:t>
-            </a:r>
-            <a:r>
-              <a:rPr lang="en-US" dirty="0" smtClean="0"/>
-              <a:t>value, in which 3*3*3  T1 cubic image and 3*3*3 T2 cubic image in same physical coordinates;</a:t>
+              <a:t>Input layer: 54 nodes with normalized MRI Brain gray pixel value, in which 3*3*3  T1 cubic image and 3*3*3 T2 cubic image in same physical coordinates;</a:t>
             </a:r>
           </a:p>
           <a:p>
@@ -4326,7 +4318,6 @@
               <a:rPr lang="en-US" dirty="0" smtClean="0"/>
               <a:t>Ground Truth: 26 categories label file with same physical coordinates with T1 image; </a:t>
             </a:r>
-            <a:endParaRPr lang="en-US" dirty="0" smtClean="0"/>
           </a:p>
           <a:p>
             <a:r>
@@ -4460,19 +4451,7 @@
           <a:p>
             <a:r>
               <a:rPr lang="en-US" dirty="0" smtClean="0"/>
-              <a:t>Test Environment </a:t>
-            </a:r>
-            <a:r>
-              <a:rPr lang="en-US" dirty="0" smtClean="0"/>
-              <a:t> in </a:t>
-            </a:r>
-            <a:r>
-              <a:rPr lang="en-US" dirty="0" smtClean="0"/>
-              <a:t>Argon </a:t>
-            </a:r>
-            <a:r>
-              <a:rPr lang="en-US" dirty="0" smtClean="0"/>
-              <a:t>HPC -1</a:t>
+              <a:t>Test Environment  in Argon HPC -1</a:t>
             </a:r>
             <a:endParaRPr lang="en-US" dirty="0"/>
           </a:p>
@@ -4708,13 +4687,8 @@
           <a:p>
             <a:r>
               <a:rPr lang="en-US" dirty="0" smtClean="0"/>
-              <a:t>Run </a:t>
-            </a:r>
-            <a:r>
-              <a:rPr lang="en-US" dirty="0" smtClean="0"/>
-              <a:t>command line: </a:t>
-            </a:r>
-            <a:endParaRPr lang="en-US" dirty="0" smtClean="0"/>
+              <a:t>Run command line: </a:t>
+            </a:r>
           </a:p>
           <a:p>
             <a:pPr marL="457200" lvl="1" indent="0">
@@ -4826,11 +4800,7 @@
           <a:p>
             <a:r>
               <a:rPr lang="en-US" dirty="0" smtClean="0"/>
-              <a:t>Test Environment in Argon </a:t>
-            </a:r>
-            <a:r>
-              <a:rPr lang="en-US" dirty="0" smtClean="0"/>
-              <a:t>HPC -2</a:t>
+              <a:t>Test Environment in Argon HPC -2</a:t>
             </a:r>
             <a:endParaRPr lang="en-US" dirty="0"/>
           </a:p>
@@ -4989,11 +4959,7 @@
             </a:r>
             <a:r>
               <a:rPr lang="en-US" dirty="0"/>
-              <a:t>manually compiled Tensorflow </a:t>
-            </a:r>
-            <a:r>
-              <a:rPr lang="en-US" dirty="0"/>
-              <a:t>library </a:t>
+              <a:t>manually compiled Tensorflow library </a:t>
             </a:r>
             <a:r>
               <a:rPr lang="en-US" sz="2100" b="1" dirty="0">
@@ -5001,15 +4967,7 @@
                   <a:schemeClr val="accent1"/>
                 </a:solidFill>
               </a:rPr>
-              <a:t>doesn’t uses </a:t>
-            </a:r>
-            <a:r>
-              <a:rPr lang="en-US" sz="2100" b="1" dirty="0">
-                <a:solidFill>
-                  <a:schemeClr val="accent1"/>
-                </a:solidFill>
-              </a:rPr>
-              <a:t>SSE, AVX, FMA </a:t>
+              <a:t>doesn’t uses SSE, AVX, FMA </a:t>
             </a:r>
             <a:r>
               <a:rPr lang="en-US" dirty="0"/>
@@ -5027,11 +4985,7 @@
           <a:p>
             <a:r>
               <a:rPr lang="is-IS" dirty="0" smtClean="0"/>
-              <a:t>Intel </a:t>
-            </a:r>
-            <a:r>
-              <a:rPr lang="is-IS" dirty="0" smtClean="0"/>
-              <a:t>mkl 2018.0.0: </a:t>
+              <a:t>Intel mkl 2018.0.0: </a:t>
             </a:r>
             <a:r>
               <a:rPr lang="en-US" dirty="0" smtClean="0"/>
@@ -5087,13 +5041,8 @@
           <a:p>
             <a:r>
               <a:rPr lang="en-US" dirty="0" smtClean="0"/>
-              <a:t>Run </a:t>
-            </a:r>
-            <a:r>
-              <a:rPr lang="en-US" dirty="0" smtClean="0"/>
-              <a:t>command line: </a:t>
-            </a:r>
-            <a:endParaRPr lang="en-US" dirty="0" smtClean="0"/>
+              <a:t>Run command line: </a:t>
+            </a:r>
           </a:p>
           <a:p>
             <a:pPr marL="457200" lvl="1" indent="0">
@@ -7664,7 +7613,11 @@
           <a:p>
             <a:r>
               <a:rPr lang="en-US" dirty="0" smtClean="0"/>
-              <a:t>Test date: Oct 4</a:t>
+              <a:t>Test date: Oct </a:t>
+            </a:r>
+            <a:r>
+              <a:rPr lang="en-US" dirty="0" smtClean="0"/>
+              <a:t>5</a:t>
             </a:r>
             <a:r>
               <a:rPr lang="en-US" baseline="30000" dirty="0" smtClean="0"/>
@@ -7678,6 +7631,30 @@
           </a:p>
         </p:txBody>
       </p:sp>
+      <p:pic>
+        <p:nvPicPr>
+          <p:cNvPr id="8" name="Picture 7"/>
+          <p:cNvPicPr>
+            <a:picLocks noChangeAspect="1"/>
+          </p:cNvPicPr>
+          <p:nvPr/>
+        </p:nvPicPr>
+        <p:blipFill>
+          <a:blip r:embed="rId3"/>
+          <a:stretch>
+            <a:fillRect/>
+          </a:stretch>
+        </p:blipFill>
+        <p:spPr>
+          <a:xfrm>
+            <a:off x="6148832" y="835406"/>
+            <a:ext cx="4064000" cy="2882900"/>
+          </a:xfrm>
+          <a:prstGeom prst="rect">
+            <a:avLst/>
+          </a:prstGeom>
+        </p:spPr>
+      </p:pic>
     </p:spTree>
     <p:extLst>
       <p:ext uri="{BB962C8B-B14F-4D97-AF65-F5344CB8AC3E}">

</xml_diff>

<commit_message>
update test result of HPC multicore with request specific resources
</commit_message>
<xml_diff>
--- a/TensorflowScalabilityTest.pptx
+++ b/TensorflowScalabilityTest.pptx
@@ -208,7 +208,7 @@
           <a:p>
             <a:fld id="{6E0FC61B-438D-3A4B-BE07-2CA3E69BE524}" type="datetimeFigureOut">
               <a:rPr lang="en-US" smtClean="0"/>
-              <a:t>10/5/17</a:t>
+              <a:t>10/17/17</a:t>
             </a:fld>
             <a:endParaRPr lang="en-US"/>
           </a:p>
@@ -691,7 +691,7 @@
           <a:p>
             <a:fld id="{2114E835-5FA6-8A40-8097-C04DC1B8AFDC}" type="datetime1">
               <a:rPr lang="en-US" smtClean="0"/>
-              <a:t>10/5/17</a:t>
+              <a:t>10/17/17</a:t>
             </a:fld>
             <a:endParaRPr lang="en-US"/>
           </a:p>
@@ -861,7 +861,7 @@
           <a:p>
             <a:fld id="{D02507F0-C546-5D4A-98D5-FE825995B7A4}" type="datetime1">
               <a:rPr lang="en-US" smtClean="0"/>
-              <a:t>10/5/17</a:t>
+              <a:t>10/17/17</a:t>
             </a:fld>
             <a:endParaRPr lang="en-US"/>
           </a:p>
@@ -1041,7 +1041,7 @@
           <a:p>
             <a:fld id="{4FA9C43D-5060-FC42-B3DE-9B34E1B634EB}" type="datetime1">
               <a:rPr lang="en-US" smtClean="0"/>
-              <a:t>10/5/17</a:t>
+              <a:t>10/17/17</a:t>
             </a:fld>
             <a:endParaRPr lang="en-US"/>
           </a:p>
@@ -1211,7 +1211,7 @@
           <a:p>
             <a:fld id="{1227501B-172F-2D40-8C05-C80F8A266233}" type="datetime1">
               <a:rPr lang="en-US" smtClean="0"/>
-              <a:t>10/5/17</a:t>
+              <a:t>10/17/17</a:t>
             </a:fld>
             <a:endParaRPr lang="en-US"/>
           </a:p>
@@ -1457,7 +1457,7 @@
           <a:p>
             <a:fld id="{158C9B4A-08A2-6147-8C66-2CA86A1C2CC1}" type="datetime1">
               <a:rPr lang="en-US" smtClean="0"/>
-              <a:t>10/5/17</a:t>
+              <a:t>10/17/17</a:t>
             </a:fld>
             <a:endParaRPr lang="en-US"/>
           </a:p>
@@ -1689,7 +1689,7 @@
           <a:p>
             <a:fld id="{84B048FE-46D8-7648-B1D9-02EAA3F919B5}" type="datetime1">
               <a:rPr lang="en-US" smtClean="0"/>
-              <a:t>10/5/17</a:t>
+              <a:t>10/17/17</a:t>
             </a:fld>
             <a:endParaRPr lang="en-US"/>
           </a:p>
@@ -2056,7 +2056,7 @@
           <a:p>
             <a:fld id="{34FAD8A9-3430-E846-BC47-E47A75003C48}" type="datetime1">
               <a:rPr lang="en-US" smtClean="0"/>
-              <a:t>10/5/17</a:t>
+              <a:t>10/17/17</a:t>
             </a:fld>
             <a:endParaRPr lang="en-US"/>
           </a:p>
@@ -2174,7 +2174,7 @@
           <a:p>
             <a:fld id="{A3F67BFF-3F57-B246-BBD5-73D9B7B1AC75}" type="datetime1">
               <a:rPr lang="en-US" smtClean="0"/>
-              <a:t>10/5/17</a:t>
+              <a:t>10/17/17</a:t>
             </a:fld>
             <a:endParaRPr lang="en-US"/>
           </a:p>
@@ -2269,7 +2269,7 @@
           <a:p>
             <a:fld id="{1D68328A-485D-7142-8777-407E24CAF04C}" type="datetime1">
               <a:rPr lang="en-US" smtClean="0"/>
-              <a:t>10/5/17</a:t>
+              <a:t>10/17/17</a:t>
             </a:fld>
             <a:endParaRPr lang="en-US"/>
           </a:p>
@@ -2546,7 +2546,7 @@
           <a:p>
             <a:fld id="{F21E18F7-8D37-844F-A7E2-9E568A43F918}" type="datetime1">
               <a:rPr lang="en-US" smtClean="0"/>
-              <a:t>10/5/17</a:t>
+              <a:t>10/17/17</a:t>
             </a:fld>
             <a:endParaRPr lang="en-US"/>
           </a:p>
@@ -2799,7 +2799,7 @@
           <a:p>
             <a:fld id="{C01D5FDF-DEC6-8448-AE54-F498099D22E7}" type="datetime1">
               <a:rPr lang="en-US" smtClean="0"/>
-              <a:t>10/5/17</a:t>
+              <a:t>10/17/17</a:t>
             </a:fld>
             <a:endParaRPr lang="en-US"/>
           </a:p>
@@ -3012,7 +3012,7 @@
           <a:p>
             <a:fld id="{69230450-1C98-3B4F-BB2D-ACF9AC5FF464}" type="datetime1">
               <a:rPr lang="en-US" smtClean="0"/>
-              <a:t>10/5/17</a:t>
+              <a:t>10/17/17</a:t>
             </a:fld>
             <a:endParaRPr lang="en-US"/>
           </a:p>
@@ -3717,7 +3717,11 @@
             </a:pPr>
             <a:r>
               <a:rPr lang="en-US" dirty="0" smtClean="0"/>
-              <a:t>Test date: Oct 04</a:t>
+              <a:t>Test date: Oct </a:t>
+            </a:r>
+            <a:r>
+              <a:rPr lang="en-US" dirty="0" smtClean="0"/>
+              <a:t>05</a:t>
             </a:r>
             <a:r>
               <a:rPr lang="en-US" baseline="30000" dirty="0" smtClean="0"/>
@@ -3731,6 +3735,30 @@
           </a:p>
         </p:txBody>
       </p:sp>
+      <p:pic>
+        <p:nvPicPr>
+          <p:cNvPr id="3" name="Picture 2"/>
+          <p:cNvPicPr>
+            <a:picLocks noChangeAspect="1"/>
+          </p:cNvPicPr>
+          <p:nvPr/>
+        </p:nvPicPr>
+        <p:blipFill>
+          <a:blip r:embed="rId3"/>
+          <a:stretch>
+            <a:fillRect/>
+          </a:stretch>
+        </p:blipFill>
+        <p:spPr>
+          <a:xfrm>
+            <a:off x="6018932" y="743990"/>
+            <a:ext cx="5836053" cy="2980112"/>
+          </a:xfrm>
+          <a:prstGeom prst="rect">
+            <a:avLst/>
+          </a:prstGeom>
+        </p:spPr>
+      </p:pic>
     </p:spTree>
     <p:extLst>
       <p:ext uri="{BB962C8B-B14F-4D97-AF65-F5344CB8AC3E}">
@@ -7613,11 +7641,7 @@
           <a:p>
             <a:r>
               <a:rPr lang="en-US" dirty="0" smtClean="0"/>
-              <a:t>Test date: Oct </a:t>
-            </a:r>
-            <a:r>
-              <a:rPr lang="en-US" dirty="0" smtClean="0"/>
-              <a:t>5</a:t>
+              <a:t>Test date: Oct 5</a:t>
             </a:r>
             <a:r>
               <a:rPr lang="en-US" baseline="30000" dirty="0" smtClean="0"/>

</xml_diff>